<commit_message>
speech and diapo update
</commit_message>
<xml_diff>
--- a/Documents/theme/diapo.pptx
+++ b/Documents/theme/diapo.pptx
@@ -18128,7 +18128,7 @@
         <p:txBody>
           <a:bodyPr/>
           <a:p>
-            <a:pPr marL="571500" indent="-571500" algn="ctr">
+            <a:pPr marL="571500" indent="-571500" algn="just">
               <a:buFont typeface="+mj-lt"/>
               <a:buAutoNum type="romanUcPeriod"/>
             </a:pPr>
@@ -18142,6 +18142,17 @@
             <a:endParaRPr lang="" altLang="en-US" b="1">
               <a:latin typeface="Times New Roman" panose="02020603050405020304" charset="0"/>
               <a:cs typeface="Times New Roman" panose="02020603050405020304" charset="0"/>
+            </a:endParaRPr>
+          </a:p>
+          <a:p>
+            <a:pPr marL="457200" lvl="1" indent="0" algn="just">
+              <a:buFont typeface="Arial" panose="020B0604020202020204" pitchFamily="34" charset="0"/>
+              <a:buNone/>
+            </a:pPr>
+            <a:endParaRPr lang="" altLang="en-US" b="1">
+              <a:latin typeface="Times New Roman" panose="02020603050405020304" charset="0"/>
+              <a:cs typeface="Times New Roman" panose="02020603050405020304" charset="0"/>
+              <a:sym typeface="+mn-ea"/>
             </a:endParaRPr>
           </a:p>
         </p:txBody>
@@ -18356,8 +18367,8 @@
         </p:blipFill>
         <p:spPr>
           <a:xfrm>
-            <a:off x="4162425" y="2219960"/>
-            <a:ext cx="3517265" cy="3301365"/>
+            <a:off x="341630" y="1929130"/>
+            <a:ext cx="1457325" cy="1094740"/>
           </a:xfrm>
           <a:prstGeom prst="rect">
             <a:avLst/>
@@ -18366,24 +18377,22 @@
       </p:pic>
       <p:sp>
         <p:nvSpPr>
-          <p:cNvPr id="9" name="Rectangle 8"/>
+          <p:cNvPr id="18" name="Rounded Rectangular Callout 17"/>
           <p:cNvSpPr/>
           <p:nvPr/>
         </p:nvSpPr>
         <p:spPr>
           <a:xfrm>
-            <a:off x="3907155" y="5521325"/>
-            <a:ext cx="4377690" cy="963295"/>
-          </a:xfrm>
-          <a:prstGeom prst="rect">
-            <a:avLst/>
-          </a:prstGeom>
-          <a:solidFill>
-            <a:schemeClr val="bg1"/>
-          </a:solidFill>
-          <a:ln>
-            <a:noFill/>
-          </a:ln>
+            <a:off x="3964305" y="5995670"/>
+            <a:ext cx="4900295" cy="542925"/>
+          </a:xfrm>
+          <a:prstGeom prst="wedgeRoundRectCallout">
+            <a:avLst>
+              <a:gd name="adj1" fmla="val -82279"/>
+              <a:gd name="adj2" fmla="val 4853"/>
+              <a:gd name="adj3" fmla="val 16667"/>
+            </a:avLst>
+          </a:prstGeom>
         </p:spPr>
         <p:style>
           <a:lnRef idx="2">
@@ -18404,47 +18413,222 @@
         <p:txBody>
           <a:bodyPr rtlCol="0" anchor="ctr"/>
           <a:p>
-            <a:pPr algn="ctr"/>
-            <a:r>
-              <a:rPr lang="" altLang="en-US" sz="2400" b="1">
+            <a:pPr algn="just"/>
+            <a:r>
+              <a:rPr lang="en-US" altLang="en-US" sz="2400" b="1">
+                <a:solidFill>
+                  <a:schemeClr val="bg1"/>
+                </a:solidFill>
+                <a:latin typeface="Times New Roman" panose="02020603050405020304" charset="0"/>
+                <a:cs typeface="Times New Roman" panose="02020603050405020304" charset="0"/>
+                <a:sym typeface="+mn-ea"/>
+              </a:rPr>
+              <a:t>De nos jours :</a:t>
+            </a:r>
+            <a:r>
+              <a:rPr lang="en-US" altLang="en-US" sz="2400" b="1">
                 <a:solidFill>
                   <a:schemeClr val="tx1"/>
                 </a:solidFill>
                 <a:latin typeface="Times New Roman" panose="02020603050405020304" charset="0"/>
                 <a:cs typeface="Times New Roman" panose="02020603050405020304" charset="0"/>
-              </a:rPr>
-              <a:t>Tablette sumérienne en argile</a:t>
-            </a:r>
-            <a:endParaRPr lang="" altLang="en-US" sz="2400" b="1">
-              <a:solidFill>
-                <a:schemeClr val="tx1"/>
-              </a:solidFill>
-              <a:latin typeface="Times New Roman" panose="02020603050405020304" charset="0"/>
-              <a:cs typeface="Times New Roman" panose="02020603050405020304" charset="0"/>
-            </a:endParaRPr>
-          </a:p>
-          <a:p>
-            <a:pPr algn="ctr"/>
-            <a:r>
-              <a:rPr lang="" altLang="en-US" sz="2400" b="1">
+                <a:sym typeface="+mn-ea"/>
+              </a:rPr>
+              <a:t>  Document en réseau</a:t>
+            </a:r>
+            <a:endParaRPr lang="en-US" sz="2400"/>
+          </a:p>
+        </p:txBody>
+      </p:sp>
+      <p:sp>
+        <p:nvSpPr>
+          <p:cNvPr id="19" name="Rounded Rectangular Callout 18"/>
+          <p:cNvSpPr/>
+          <p:nvPr/>
+        </p:nvSpPr>
+        <p:spPr>
+          <a:xfrm>
+            <a:off x="4122420" y="3514725"/>
+            <a:ext cx="4126865" cy="542925"/>
+          </a:xfrm>
+          <a:prstGeom prst="wedgeRoundRectCallout">
+            <a:avLst>
+              <a:gd name="adj1" fmla="val -92745"/>
+              <a:gd name="adj2" fmla="val 4736"/>
+              <a:gd name="adj3" fmla="val 16667"/>
+            </a:avLst>
+          </a:prstGeom>
+        </p:spPr>
+        <p:style>
+          <a:lnRef idx="2">
+            <a:schemeClr val="accent1">
+              <a:shade val="50000"/>
+            </a:schemeClr>
+          </a:lnRef>
+          <a:fillRef idx="1">
+            <a:schemeClr val="accent1"/>
+          </a:fillRef>
+          <a:effectRef idx="0">
+            <a:schemeClr val="accent1"/>
+          </a:effectRef>
+          <a:fontRef idx="minor">
+            <a:schemeClr val="lt1"/>
+          </a:fontRef>
+        </p:style>
+        <p:txBody>
+          <a:bodyPr rtlCol="0" anchor="ctr"/>
+          <a:p>
+            <a:pPr algn="just"/>
+            <a:r>
+              <a:rPr lang="en-US" altLang="en-US" sz="2400" b="1">
+                <a:solidFill>
+                  <a:schemeClr val="bg1"/>
+                </a:solidFill>
+                <a:latin typeface="Times New Roman" panose="02020603050405020304" charset="0"/>
+                <a:cs typeface="Times New Roman" panose="02020603050405020304" charset="0"/>
+                <a:sym typeface="+mn-ea"/>
+              </a:rPr>
+              <a:t>1980 :</a:t>
+            </a:r>
+            <a:r>
+              <a:rPr lang="en-US" altLang="en-US" sz="2400" b="1">
                 <a:solidFill>
                   <a:schemeClr val="tx1"/>
                 </a:solidFill>
                 <a:latin typeface="Times New Roman" panose="02020603050405020304" charset="0"/>
                 <a:cs typeface="Times New Roman" panose="02020603050405020304" charset="0"/>
-              </a:rPr>
-              <a:t>(3400-3200 av. J.C.)</a:t>
-            </a:r>
-            <a:endParaRPr lang="" altLang="en-US" sz="2400" b="1">
-              <a:solidFill>
-                <a:schemeClr val="tx1"/>
-              </a:solidFill>
-              <a:latin typeface="Times New Roman" panose="02020603050405020304" charset="0"/>
-              <a:cs typeface="Times New Roman" panose="02020603050405020304" charset="0"/>
-            </a:endParaRPr>
-          </a:p>
-        </p:txBody>
-      </p:sp>
+                <a:sym typeface="+mn-ea"/>
+              </a:rPr>
+              <a:t> Document structuré</a:t>
+            </a:r>
+            <a:endParaRPr lang="en-US" sz="2400"/>
+          </a:p>
+        </p:txBody>
+      </p:sp>
+      <p:sp>
+        <p:nvSpPr>
+          <p:cNvPr id="20" name="Rounded Rectangular Callout 19"/>
+          <p:cNvSpPr/>
+          <p:nvPr/>
+        </p:nvSpPr>
+        <p:spPr>
+          <a:xfrm>
+            <a:off x="4122420" y="1697990"/>
+            <a:ext cx="7269480" cy="838200"/>
+          </a:xfrm>
+          <a:prstGeom prst="wedgeRoundRectCallout">
+            <a:avLst>
+              <a:gd name="adj1" fmla="val -81254"/>
+              <a:gd name="adj2" fmla="val 25606"/>
+              <a:gd name="adj3" fmla="val 16667"/>
+            </a:avLst>
+          </a:prstGeom>
+        </p:spPr>
+        <p:style>
+          <a:lnRef idx="2">
+            <a:schemeClr val="accent1">
+              <a:shade val="50000"/>
+            </a:schemeClr>
+          </a:lnRef>
+          <a:fillRef idx="1">
+            <a:schemeClr val="accent1"/>
+          </a:fillRef>
+          <a:effectRef idx="0">
+            <a:schemeClr val="accent1"/>
+          </a:effectRef>
+          <a:fontRef idx="minor">
+            <a:schemeClr val="lt1"/>
+          </a:fontRef>
+        </p:style>
+        <p:txBody>
+          <a:bodyPr rtlCol="0" anchor="ctr"/>
+          <a:p>
+            <a:pPr algn="just"/>
+            <a:r>
+              <a:rPr lang="en-US" sz="2400" b="1">
+                <a:solidFill>
+                  <a:schemeClr val="bg1"/>
+                </a:solidFill>
+                <a:latin typeface="Times New Roman" panose="02020603050405020304" charset="0"/>
+                <a:cs typeface="Times New Roman" panose="02020603050405020304" charset="0"/>
+                <a:sym typeface="+mn-ea"/>
+              </a:rPr>
+              <a:t>3400-3200 av. J.C. </a:t>
+            </a:r>
+            <a:r>
+              <a:rPr lang="en-US" altLang="en-US" sz="2400" b="1">
+                <a:solidFill>
+                  <a:schemeClr val="bg1"/>
+                </a:solidFill>
+                <a:latin typeface="Times New Roman" panose="02020603050405020304" charset="0"/>
+                <a:cs typeface="Times New Roman" panose="02020603050405020304" charset="0"/>
+                <a:sym typeface="+mn-ea"/>
+              </a:rPr>
+              <a:t>:</a:t>
+            </a:r>
+            <a:r>
+              <a:rPr lang="en-US" altLang="en-US" sz="2400" b="1">
+                <a:solidFill>
+                  <a:schemeClr val="tx1"/>
+                </a:solidFill>
+                <a:latin typeface="Times New Roman" panose="02020603050405020304" charset="0"/>
+                <a:cs typeface="Times New Roman" panose="02020603050405020304" charset="0"/>
+                <a:sym typeface="+mn-ea"/>
+              </a:rPr>
+              <a:t> Tablettes sumérienne en argile</a:t>
+            </a:r>
+            <a:endParaRPr lang="en-US" sz="2400"/>
+          </a:p>
+        </p:txBody>
+      </p:sp>
+      <p:pic>
+        <p:nvPicPr>
+          <p:cNvPr id="21" name="Picture 20" descr="doc_en_reseau"/>
+          <p:cNvPicPr>
+            <a:picLocks noChangeAspect="1"/>
+          </p:cNvPicPr>
+          <p:nvPr/>
+        </p:nvPicPr>
+        <p:blipFill>
+          <a:blip r:embed="rId2"/>
+          <a:stretch>
+            <a:fillRect/>
+          </a:stretch>
+        </p:blipFill>
+        <p:spPr>
+          <a:xfrm>
+            <a:off x="81915" y="5024755"/>
+            <a:ext cx="2018030" cy="1904365"/>
+          </a:xfrm>
+          <a:prstGeom prst="rect">
+            <a:avLst/>
+          </a:prstGeom>
+        </p:spPr>
+      </p:pic>
+      <p:pic>
+        <p:nvPicPr>
+          <p:cNvPr id="22" name="Picture 21" descr="doc_structure"/>
+          <p:cNvPicPr>
+            <a:picLocks noChangeAspect="1"/>
+          </p:cNvPicPr>
+          <p:nvPr/>
+        </p:nvPicPr>
+        <p:blipFill>
+          <a:blip r:embed="rId3"/>
+          <a:stretch>
+            <a:fillRect/>
+          </a:stretch>
+        </p:blipFill>
+        <p:spPr>
+          <a:xfrm>
+            <a:off x="341630" y="3298825"/>
+            <a:ext cx="2015490" cy="1725930"/>
+          </a:xfrm>
+          <a:prstGeom prst="rect">
+            <a:avLst/>
+          </a:prstGeom>
+        </p:spPr>
+      </p:pic>
     </p:spTree>
   </p:cSld>
   <p:clrMapOvr>

</xml_diff>

<commit_message>
diapo et speech update
</commit_message>
<xml_diff>
--- a/Documents/theme/diapo.pptx
+++ b/Documents/theme/diapo.pptx
@@ -4514,7 +4514,7 @@
                 <a:latin typeface="Times New Roman" panose="02020603050405020304" charset="0"/>
                 <a:cs typeface="Times New Roman" panose="02020603050405020304" charset="0"/>
               </a:rPr>
-              <a:t> très efficace afin de faciliter la recherche rapide</a:t>
+              <a:t> afin de faciliter la recherche rapide</a:t>
             </a:r>
             <a:endParaRPr lang="en-US" sz="2200" b="1">
               <a:solidFill>
@@ -5279,7 +5279,7 @@
         </p:nvSpPr>
         <p:spPr>
           <a:xfrm>
-            <a:off x="3274695" y="4132580"/>
+            <a:off x="3274695" y="4017010"/>
             <a:ext cx="6083300" cy="722630"/>
           </a:xfrm>
           <a:prstGeom prst="wedgeRoundRectCallout">
@@ -5407,8 +5407,8 @@
         </p:nvSpPr>
         <p:spPr>
           <a:xfrm>
-            <a:off x="5227320" y="5243830"/>
-            <a:ext cx="6640830" cy="1447165"/>
+            <a:off x="5227320" y="4948555"/>
+            <a:ext cx="6640830" cy="1781810"/>
           </a:xfrm>
           <a:prstGeom prst="wedgeRoundRectCallout">
             <a:avLst>
@@ -5439,7 +5439,7 @@
           <a:p>
             <a:pPr algn="just"/>
             <a:r>
-              <a:rPr lang="en-US" altLang="en-US" sz="2200" b="1">
+              <a:rPr lang="en-US" altLang="en-US" sz="2400" b="1">
                 <a:solidFill>
                   <a:schemeClr val="bg1"/>
                 </a:solidFill>
@@ -5448,7 +5448,7 @@
               </a:rPr>
               <a:t>Mode de paiement</a:t>
             </a:r>
-            <a:endParaRPr lang="en-US" altLang="en-US" sz="2200" b="1">
+            <a:endParaRPr lang="en-US" altLang="en-US" sz="2400" b="1">
               <a:solidFill>
                 <a:schemeClr val="bg1"/>
               </a:solidFill>
@@ -5462,7 +5462,7 @@
               <a:buChar char="•"/>
             </a:pPr>
             <a:r>
-              <a:rPr lang="en-US" altLang="en-US" sz="2200" b="1">
+              <a:rPr lang="en-US" altLang="en-US" sz="2400" b="1">
                 <a:solidFill>
                   <a:schemeClr val="bg1"/>
                 </a:solidFill>
@@ -5472,16 +5472,36 @@
               <a:t>paiement à distance</a:t>
             </a:r>
             <a:r>
-              <a:rPr lang="en-US" altLang="en-US" sz="2200" b="1">
+              <a:rPr lang="en-US" altLang="en-US" sz="2400" b="1">
                 <a:solidFill>
                   <a:schemeClr val="tx1"/>
                 </a:solidFill>
                 <a:latin typeface="Times New Roman" panose="02020603050405020304" charset="0"/>
                 <a:cs typeface="Times New Roman" panose="02020603050405020304" charset="0"/>
               </a:rPr>
-              <a:t>(Intenet, SMS, QR code) </a:t>
-            </a:r>
-            <a:endParaRPr lang="en-US" altLang="en-US" sz="2200" b="1">
+              <a:t>(Inte</a:t>
+            </a:r>
+            <a:r>
+              <a:rPr lang="" altLang="en-US" sz="2400" b="1">
+                <a:solidFill>
+                  <a:schemeClr val="tx1"/>
+                </a:solidFill>
+                <a:latin typeface="Times New Roman" panose="02020603050405020304" charset="0"/>
+                <a:cs typeface="Times New Roman" panose="02020603050405020304" charset="0"/>
+              </a:rPr>
+              <a:t>r</a:t>
+            </a:r>
+            <a:r>
+              <a:rPr lang="en-US" altLang="en-US" sz="2400" b="1">
+                <a:solidFill>
+                  <a:schemeClr val="tx1"/>
+                </a:solidFill>
+                <a:latin typeface="Times New Roman" panose="02020603050405020304" charset="0"/>
+                <a:cs typeface="Times New Roman" panose="02020603050405020304" charset="0"/>
+              </a:rPr>
+              <a:t>net, SMS, QR code) </a:t>
+            </a:r>
+            <a:endParaRPr lang="en-US" altLang="en-US" sz="2400" b="1">
               <a:solidFill>
                 <a:schemeClr val="tx1"/>
               </a:solidFill>
@@ -5495,17 +5515,37 @@
               <a:buChar char="•"/>
             </a:pPr>
             <a:r>
-              <a:rPr lang="en-US" altLang="en-US" sz="2200" b="1">
+              <a:rPr lang="en-US" altLang="en-US" sz="2400" b="1">
                 <a:solidFill>
                   <a:schemeClr val="bg1"/>
                 </a:solidFill>
                 <a:latin typeface="Times New Roman" panose="02020603050405020304" charset="0"/>
                 <a:cs typeface="Times New Roman" panose="02020603050405020304" charset="0"/>
               </a:rPr>
-              <a:t>paiement de contact</a:t>
-            </a:r>
-            <a:r>
-              <a:rPr lang="en-US" altLang="en-US" sz="2200" b="1">
+              <a:t>paiement </a:t>
+            </a:r>
+            <a:r>
+              <a:rPr lang="" sz="2400" b="1">
+                <a:solidFill>
+                  <a:schemeClr val="bg1"/>
+                </a:solidFill>
+                <a:latin typeface="Times New Roman" panose="02020603050405020304" charset="0"/>
+                <a:cs typeface="Times New Roman" panose="02020603050405020304" charset="0"/>
+              </a:rPr>
+              <a:t>de </a:t>
+            </a:r>
+            <a:r>
+              <a:rPr lang="" altLang="en-US" sz="2400" b="1">
+                <a:solidFill>
+                  <a:schemeClr val="bg1"/>
+                </a:solidFill>
+                <a:latin typeface="Times New Roman" panose="02020603050405020304" charset="0"/>
+                <a:cs typeface="Times New Roman" panose="02020603050405020304" charset="0"/>
+              </a:rPr>
+              <a:t>proximité</a:t>
+            </a:r>
+            <a:r>
+              <a:rPr lang="en-US" altLang="en-US" sz="2400" b="1">
                 <a:solidFill>
                   <a:schemeClr val="tx1"/>
                 </a:solidFill>
@@ -5515,7 +5555,7 @@
               <a:t>(NFC, ondes sonores,</a:t>
             </a:r>
             <a:r>
-              <a:rPr lang="en-US" altLang="en-US" sz="2200" b="1">
+              <a:rPr lang="en-US" altLang="en-US" sz="2400" b="1">
                 <a:solidFill>
                   <a:schemeClr val="bg1"/>
                 </a:solidFill>
@@ -5525,7 +5565,7 @@
               <a:t> </a:t>
             </a:r>
             <a:r>
-              <a:rPr lang="en-US" altLang="en-US" sz="2200" b="1">
+              <a:rPr lang="en-US" altLang="en-US" sz="2400" b="1">
                 <a:solidFill>
                   <a:schemeClr val="tx1"/>
                 </a:solidFill>
@@ -5534,7 +5574,7 @@
               </a:rPr>
               <a:t>MST) </a:t>
             </a:r>
-            <a:endParaRPr lang="en-US" altLang="en-US" sz="2200" b="1">
+            <a:endParaRPr lang="en-US" altLang="en-US" sz="2400" b="1">
               <a:solidFill>
                 <a:schemeClr val="tx1"/>
               </a:solidFill>
@@ -5548,7 +5588,7 @@
               <a:buChar char="•"/>
             </a:pPr>
             <a:r>
-              <a:rPr lang="en-US" altLang="en-US" sz="2200" b="1">
+              <a:rPr lang="en-US" altLang="en-US" sz="2400" b="1">
                 <a:solidFill>
                   <a:schemeClr val="bg1"/>
                 </a:solidFill>
@@ -5557,7 +5597,7 @@
               </a:rPr>
               <a:t>paiement de mobile à mobile</a:t>
             </a:r>
-            <a:endParaRPr lang="en-US" altLang="en-US" sz="2200" b="1">
+            <a:endParaRPr lang="en-US" altLang="en-US" sz="2400" b="1">
               <a:solidFill>
                 <a:schemeClr val="bg1"/>
               </a:solidFill>
@@ -6072,7 +6112,14 @@
                 <a:latin typeface="Times New Roman" panose="02020603050405020304" charset="0"/>
                 <a:cs typeface="Times New Roman" panose="02020603050405020304" charset="0"/>
               </a:rPr>
-              <a:t>Sites web d’informations des grands médias traditionnels</a:t>
+              <a:t>Sites web d’informations des grands médias traditionnels </a:t>
+            </a:r>
+            <a:r>
+              <a:rPr lang="" altLang="en-US" sz="2800" b="1">
+                <a:latin typeface="Times New Roman" panose="02020603050405020304" charset="0"/>
+                <a:cs typeface="Times New Roman" panose="02020603050405020304" charset="0"/>
+              </a:rPr>
+              <a:t>: </a:t>
             </a:r>
             <a:r>
               <a:rPr lang="en-US" altLang="en-US" sz="2800" b="1">
@@ -6082,7 +6129,7 @@
                 <a:latin typeface="Times New Roman" panose="02020603050405020304" charset="0"/>
                 <a:cs typeface="Times New Roman" panose="02020603050405020304" charset="0"/>
               </a:rPr>
-              <a:t>(Jeune Afrique, Le Monde)</a:t>
+              <a:t>Jeune Afrique, Le Monde</a:t>
             </a:r>
             <a:endParaRPr lang="en-US" altLang="en-US" sz="2800" b="1">
               <a:solidFill>
@@ -6102,7 +6149,14 @@
                 <a:latin typeface="Times New Roman" panose="02020603050405020304" charset="0"/>
                 <a:cs typeface="Times New Roman" panose="02020603050405020304" charset="0"/>
               </a:rPr>
-              <a:t>Sites web de téléchargement</a:t>
+              <a:t>Sites web de téléchargement </a:t>
+            </a:r>
+            <a:r>
+              <a:rPr lang="" altLang="en-US" sz="2800" b="1">
+                <a:latin typeface="Times New Roman" panose="02020603050405020304" charset="0"/>
+                <a:cs typeface="Times New Roman" panose="02020603050405020304" charset="0"/>
+              </a:rPr>
+              <a:t>: </a:t>
             </a:r>
             <a:r>
               <a:rPr lang="en-US" altLang="en-US" sz="2800" b="1">
@@ -6112,7 +6166,7 @@
                 <a:latin typeface="Times New Roman" panose="02020603050405020304" charset="0"/>
                 <a:cs typeface="Times New Roman" panose="02020603050405020304" charset="0"/>
               </a:rPr>
-              <a:t>(Windows Store, Apple Store, Goople Play, Softonic)</a:t>
+              <a:t>Windows Store, Apple Store, Goople Play, Softonic</a:t>
             </a:r>
             <a:endParaRPr lang="en-US" altLang="en-US" sz="2800" b="1">
               <a:solidFill>

</xml_diff>

<commit_message>
first changes after meeting with prof
</commit_message>
<xml_diff>
--- a/Documents/theme/diapo.pptx
+++ b/Documents/theme/diapo.pptx
@@ -32,12 +32,13 @@
     <p:sldId id="283" r:id="rId25"/>
     <p:sldId id="284" r:id="rId26"/>
     <p:sldId id="286" r:id="rId27"/>
-    <p:sldId id="285" r:id="rId28"/>
-    <p:sldId id="287" r:id="rId29"/>
-    <p:sldId id="288" r:id="rId30"/>
-    <p:sldId id="289" r:id="rId31"/>
-    <p:sldId id="292" r:id="rId32"/>
-    <p:sldId id="291" r:id="rId33"/>
+    <p:sldId id="338" r:id="rId28"/>
+    <p:sldId id="285" r:id="rId29"/>
+    <p:sldId id="287" r:id="rId30"/>
+    <p:sldId id="288" r:id="rId31"/>
+    <p:sldId id="289" r:id="rId32"/>
+    <p:sldId id="292" r:id="rId33"/>
+    <p:sldId id="291" r:id="rId34"/>
   </p:sldIdLst>
   <p:sldSz cx="12192000" cy="6858000"/>
   <p:notesSz cx="6858000" cy="9144000"/>
@@ -17153,9 +17154,472 @@
         <p:txBody>
           <a:bodyPr/>
           <a:p>
-            <a:pPr marL="571500" indent="-571500" algn="just">
+            <a:pPr marL="0" indent="0" algn="just">
               <a:buFont typeface="+mj-lt"/>
-              <a:buAutoNum type="romanUcPeriod"/>
+              <a:buNone/>
+            </a:pPr>
+            <a:r>
+              <a:rPr lang="en-US" altLang="en-US" b="1">
+                <a:latin typeface="Times New Roman" panose="02020603050405020304" charset="0"/>
+                <a:cs typeface="Times New Roman" panose="02020603050405020304" charset="0"/>
+              </a:rPr>
+              <a:t>Architecture client</a:t>
+            </a:r>
+            <a:r>
+              <a:rPr lang="" altLang="en-US" b="1">
+                <a:latin typeface="Times New Roman" panose="02020603050405020304" charset="0"/>
+                <a:cs typeface="Times New Roman" panose="02020603050405020304" charset="0"/>
+              </a:rPr>
+              <a:t>/</a:t>
+            </a:r>
+            <a:r>
+              <a:rPr lang="en-US" altLang="en-US" b="1">
+                <a:latin typeface="Times New Roman" panose="02020603050405020304" charset="0"/>
+                <a:cs typeface="Times New Roman" panose="02020603050405020304" charset="0"/>
+              </a:rPr>
+              <a:t>serveur </a:t>
+            </a:r>
+            <a:r>
+              <a:rPr lang="" altLang="en-US" b="1">
+                <a:latin typeface="Times New Roman" panose="02020603050405020304" charset="0"/>
+                <a:cs typeface="Times New Roman" panose="02020603050405020304" charset="0"/>
+              </a:rPr>
+              <a:t>en </a:t>
+            </a:r>
+            <a:r>
+              <a:rPr lang="en-US" altLang="en-US" b="1">
+                <a:latin typeface="Times New Roman" panose="02020603050405020304" charset="0"/>
+                <a:cs typeface="Times New Roman" panose="02020603050405020304" charset="0"/>
+              </a:rPr>
+              <a:t>3-tiers de notre solution</a:t>
+            </a:r>
+            <a:endParaRPr lang="en-US" altLang="en-US" b="1">
+              <a:latin typeface="Times New Roman" panose="02020603050405020304" charset="0"/>
+              <a:cs typeface="Times New Roman" panose="02020603050405020304" charset="0"/>
+            </a:endParaRPr>
+          </a:p>
+        </p:txBody>
+      </p:sp>
+      <p:sp>
+        <p:nvSpPr>
+          <p:cNvPr id="4" name="Rounded Rectangle 3"/>
+          <p:cNvSpPr/>
+          <p:nvPr/>
+        </p:nvSpPr>
+        <p:spPr>
+          <a:xfrm>
+            <a:off x="82550" y="98425"/>
+            <a:ext cx="2926715" cy="1043940"/>
+          </a:xfrm>
+          <a:prstGeom prst="roundRect">
+            <a:avLst/>
+          </a:prstGeom>
+        </p:spPr>
+        <p:style>
+          <a:lnRef idx="1">
+            <a:schemeClr val="accent3"/>
+          </a:lnRef>
+          <a:fillRef idx="2">
+            <a:schemeClr val="accent3"/>
+          </a:fillRef>
+          <a:effectRef idx="1">
+            <a:schemeClr val="accent3"/>
+          </a:effectRef>
+          <a:fontRef idx="minor">
+            <a:schemeClr val="dk1"/>
+          </a:fontRef>
+        </p:style>
+        <p:txBody>
+          <a:bodyPr rtlCol="0" anchor="ctr"/>
+          <a:p>
+            <a:pPr algn="ctr"/>
+            <a:r>
+              <a:rPr lang="en-US" altLang="en-US" b="1">
+                <a:latin typeface="Times New Roman" panose="02020603050405020304" charset="0"/>
+                <a:cs typeface="Times New Roman" panose="02020603050405020304" charset="0"/>
+                <a:sym typeface="+mn-ea"/>
+              </a:rPr>
+              <a:t>ENVIRONNEMENT DE TRAVAIL</a:t>
+            </a:r>
+            <a:endParaRPr lang="en-US" altLang="en-US" b="1">
+              <a:latin typeface="Times New Roman" panose="02020603050405020304" charset="0"/>
+              <a:cs typeface="Times New Roman" panose="02020603050405020304" charset="0"/>
+            </a:endParaRPr>
+          </a:p>
+        </p:txBody>
+      </p:sp>
+      <p:sp>
+        <p:nvSpPr>
+          <p:cNvPr id="6" name="Rounded Rectangle 5"/>
+          <p:cNvSpPr/>
+          <p:nvPr/>
+        </p:nvSpPr>
+        <p:spPr>
+          <a:xfrm>
+            <a:off x="3093720" y="114300"/>
+            <a:ext cx="2926715" cy="1043940"/>
+          </a:xfrm>
+          <a:prstGeom prst="roundRect">
+            <a:avLst/>
+          </a:prstGeom>
+        </p:spPr>
+        <p:style>
+          <a:lnRef idx="1">
+            <a:schemeClr val="accent3"/>
+          </a:lnRef>
+          <a:fillRef idx="2">
+            <a:schemeClr val="accent3"/>
+          </a:fillRef>
+          <a:effectRef idx="1">
+            <a:schemeClr val="accent3"/>
+          </a:effectRef>
+          <a:fontRef idx="minor">
+            <a:schemeClr val="dk1"/>
+          </a:fontRef>
+        </p:style>
+        <p:txBody>
+          <a:bodyPr rtlCol="0" anchor="ctr"/>
+          <a:p>
+            <a:pPr algn="ctr"/>
+            <a:r>
+              <a:rPr lang="en-US" altLang="en-US" b="1">
+                <a:latin typeface="Times New Roman" panose="02020603050405020304" charset="0"/>
+                <a:cs typeface="Times New Roman" panose="02020603050405020304" charset="0"/>
+                <a:sym typeface="+mn-ea"/>
+              </a:rPr>
+              <a:t>CONCEPTS GÉNÉRAUX DU DOMAINE</a:t>
+            </a:r>
+            <a:endParaRPr lang="en-US" altLang="en-US" b="1">
+              <a:latin typeface="Times New Roman" panose="02020603050405020304" charset="0"/>
+              <a:cs typeface="Times New Roman" panose="02020603050405020304" charset="0"/>
+            </a:endParaRPr>
+          </a:p>
+        </p:txBody>
+      </p:sp>
+      <p:sp>
+        <p:nvSpPr>
+          <p:cNvPr id="7" name="Rounded Rectangle 6"/>
+          <p:cNvSpPr/>
+          <p:nvPr/>
+        </p:nvSpPr>
+        <p:spPr>
+          <a:xfrm>
+            <a:off x="6135370" y="114300"/>
+            <a:ext cx="2926715" cy="1043940"/>
+          </a:xfrm>
+          <a:prstGeom prst="roundRect">
+            <a:avLst/>
+          </a:prstGeom>
+        </p:spPr>
+        <p:style>
+          <a:lnRef idx="1">
+            <a:schemeClr val="accent3"/>
+          </a:lnRef>
+          <a:fillRef idx="2">
+            <a:schemeClr val="accent3"/>
+          </a:fillRef>
+          <a:effectRef idx="1">
+            <a:schemeClr val="accent3"/>
+          </a:effectRef>
+          <a:fontRef idx="minor">
+            <a:schemeClr val="dk1"/>
+          </a:fontRef>
+        </p:style>
+        <p:txBody>
+          <a:bodyPr rtlCol="0" anchor="ctr"/>
+          <a:p>
+            <a:pPr algn="ctr"/>
+            <a:r>
+              <a:rPr lang="en-US" altLang="en-US" b="1">
+                <a:latin typeface="Times New Roman" panose="02020603050405020304" charset="0"/>
+                <a:cs typeface="Times New Roman" panose="02020603050405020304" charset="0"/>
+                <a:sym typeface="+mn-ea"/>
+              </a:rPr>
+              <a:t>CONCEPTION</a:t>
+            </a:r>
+            <a:endParaRPr lang="en-US" altLang="en-US" b="1">
+              <a:latin typeface="Times New Roman" panose="02020603050405020304" charset="0"/>
+              <a:cs typeface="Times New Roman" panose="02020603050405020304" charset="0"/>
+            </a:endParaRPr>
+          </a:p>
+        </p:txBody>
+      </p:sp>
+      <p:sp>
+        <p:nvSpPr>
+          <p:cNvPr id="8" name="Rounded Rectangle 7"/>
+          <p:cNvSpPr/>
+          <p:nvPr/>
+        </p:nvSpPr>
+        <p:spPr>
+          <a:xfrm>
+            <a:off x="9177020" y="114300"/>
+            <a:ext cx="2926715" cy="1043940"/>
+          </a:xfrm>
+          <a:prstGeom prst="roundRect">
+            <a:avLst/>
+          </a:prstGeom>
+        </p:spPr>
+        <p:style>
+          <a:lnRef idx="2">
+            <a:schemeClr val="accent5">
+              <a:shade val="50000"/>
+            </a:schemeClr>
+          </a:lnRef>
+          <a:fillRef idx="1">
+            <a:schemeClr val="accent5"/>
+          </a:fillRef>
+          <a:effectRef idx="0">
+            <a:schemeClr val="accent5"/>
+          </a:effectRef>
+          <a:fontRef idx="minor">
+            <a:schemeClr val="lt1"/>
+          </a:fontRef>
+        </p:style>
+        <p:txBody>
+          <a:bodyPr rtlCol="0" anchor="ctr"/>
+          <a:p>
+            <a:pPr algn="ctr"/>
+            <a:r>
+              <a:rPr lang="en-US" altLang="en-US" b="1">
+                <a:latin typeface="Times New Roman" panose="02020603050405020304" charset="0"/>
+                <a:cs typeface="Times New Roman" panose="02020603050405020304" charset="0"/>
+                <a:sym typeface="+mn-ea"/>
+              </a:rPr>
+              <a:t>MISE EN OEUVRE DE LA SOLUTION</a:t>
+            </a:r>
+            <a:endParaRPr lang="en-US" altLang="en-US" b="1">
+              <a:latin typeface="Times New Roman" panose="02020603050405020304" charset="0"/>
+              <a:cs typeface="Times New Roman" panose="02020603050405020304" charset="0"/>
+            </a:endParaRPr>
+          </a:p>
+        </p:txBody>
+      </p:sp>
+      <p:pic>
+        <p:nvPicPr>
+          <p:cNvPr id="9" name="Picture 8"/>
+          <p:cNvPicPr>
+            <a:picLocks noChangeAspect="1"/>
+          </p:cNvPicPr>
+          <p:nvPr/>
+        </p:nvPicPr>
+        <p:blipFill>
+          <a:blip r:embed="rId1"/>
+          <a:stretch>
+            <a:fillRect/>
+          </a:stretch>
+        </p:blipFill>
+        <p:spPr>
+          <a:xfrm>
+            <a:off x="1020445" y="1951355"/>
+            <a:ext cx="10366375" cy="4779010"/>
+          </a:xfrm>
+          <a:prstGeom prst="rect">
+            <a:avLst/>
+          </a:prstGeom>
+        </p:spPr>
+      </p:pic>
+    </p:spTree>
+  </p:cSld>
+  <p:clrMapOvr>
+    <a:masterClrMapping/>
+  </p:clrMapOvr>
+  <p:transition>
+    <p:push dir="u"/>
+  </p:transition>
+  <p:timing>
+    <p:tnLst>
+      <p:par>
+        <p:cTn id="1" dur="indefinite" restart="never" nodeType="tmRoot">
+          <p:childTnLst>
+            <p:seq concurrent="1" nextAc="seek">
+              <p:cTn id="2" dur="indefinite" nodeType="mainSeq">
+                <p:childTnLst>
+                  <p:par>
+                    <p:cTn id="3" fill="hold">
+                      <p:stCondLst>
+                        <p:cond delay="indefinite"/>
+                        <p:cond evt="onBegin" delay="0">
+                          <p:tn val="2"/>
+                        </p:cond>
+                      </p:stCondLst>
+                      <p:childTnLst>
+                        <p:par>
+                          <p:cTn id="4" fill="hold">
+                            <p:stCondLst>
+                              <p:cond delay="0"/>
+                            </p:stCondLst>
+                            <p:childTnLst>
+                              <p:par>
+                                <p:cTn id="5" presetID="42" presetClass="entr" presetSubtype="0" fill="hold" nodeType="afterEffect">
+                                  <p:stCondLst>
+                                    <p:cond delay="0"/>
+                                  </p:stCondLst>
+                                  <p:childTnLst>
+                                    <p:set>
+                                      <p:cBhvr>
+                                        <p:cTn id="6" dur="1" fill="hold">
+                                          <p:stCondLst>
+                                            <p:cond delay="0"/>
+                                          </p:stCondLst>
+                                        </p:cTn>
+                                        <p:tgtEl>
+                                          <p:spTgt spid="9"/>
+                                        </p:tgtEl>
+                                        <p:attrNameLst>
+                                          <p:attrName>style.visibility</p:attrName>
+                                        </p:attrNameLst>
+                                      </p:cBhvr>
+                                      <p:to>
+                                        <p:strVal val="visible"/>
+                                      </p:to>
+                                    </p:set>
+                                    <p:animEffect transition="in" filter="fade">
+                                      <p:cBhvr>
+                                        <p:cTn id="7" dur="1000"/>
+                                        <p:tgtEl>
+                                          <p:spTgt spid="9"/>
+                                        </p:tgtEl>
+                                      </p:cBhvr>
+                                    </p:animEffect>
+                                    <p:anim calcmode="lin" valueType="num">
+                                      <p:cBhvr>
+                                        <p:cTn id="8" dur="1000" fill="hold"/>
+                                        <p:tgtEl>
+                                          <p:spTgt spid="9"/>
+                                        </p:tgtEl>
+                                        <p:attrNameLst>
+                                          <p:attrName>ppt_x</p:attrName>
+                                        </p:attrNameLst>
+                                      </p:cBhvr>
+                                      <p:tavLst>
+                                        <p:tav tm="0">
+                                          <p:val>
+                                            <p:strVal val="#ppt_x"/>
+                                          </p:val>
+                                        </p:tav>
+                                        <p:tav tm="100000">
+                                          <p:val>
+                                            <p:strVal val="#ppt_x"/>
+                                          </p:val>
+                                        </p:tav>
+                                      </p:tavLst>
+                                    </p:anim>
+                                    <p:anim calcmode="lin" valueType="num">
+                                      <p:cBhvr>
+                                        <p:cTn id="9" dur="1000" fill="hold"/>
+                                        <p:tgtEl>
+                                          <p:spTgt spid="9"/>
+                                        </p:tgtEl>
+                                        <p:attrNameLst>
+                                          <p:attrName>ppt_y</p:attrName>
+                                        </p:attrNameLst>
+                                      </p:cBhvr>
+                                      <p:tavLst>
+                                        <p:tav tm="0">
+                                          <p:val>
+                                            <p:strVal val="#ppt_y+.1"/>
+                                          </p:val>
+                                        </p:tav>
+                                        <p:tav tm="100000">
+                                          <p:val>
+                                            <p:strVal val="#ppt_y"/>
+                                          </p:val>
+                                        </p:tav>
+                                      </p:tavLst>
+                                    </p:anim>
+                                  </p:childTnLst>
+                                </p:cTn>
+                              </p:par>
+                            </p:childTnLst>
+                          </p:cTn>
+                        </p:par>
+                      </p:childTnLst>
+                    </p:cTn>
+                  </p:par>
+                </p:childTnLst>
+              </p:cTn>
+              <p:prevCondLst>
+                <p:cond evt="onPrev" delay="0">
+                  <p:tgtEl>
+                    <p:sldTgt/>
+                  </p:tgtEl>
+                </p:cond>
+              </p:prevCondLst>
+              <p:nextCondLst>
+                <p:cond evt="onNext" delay="0">
+                  <p:tgtEl>
+                    <p:sldTgt/>
+                  </p:tgtEl>
+                </p:cond>
+              </p:nextCondLst>
+            </p:seq>
+          </p:childTnLst>
+        </p:cTn>
+      </p:par>
+    </p:tnLst>
+  </p:timing>
+</p:sld>
+</file>
+
+<file path=ppt/slides/slide25.xml><?xml version="1.0" encoding="utf-8"?>
+<p:sld xmlns:a="http://schemas.openxmlformats.org/drawingml/2006/main" xmlns:r="http://schemas.openxmlformats.org/officeDocument/2006/relationships" xmlns:p="http://schemas.openxmlformats.org/presentationml/2006/main">
+  <p:cSld>
+    <p:spTree>
+      <p:nvGrpSpPr>
+        <p:cNvPr id="1" name=""/>
+        <p:cNvGrpSpPr/>
+        <p:nvPr/>
+      </p:nvGrpSpPr>
+      <p:grpSpPr/>
+      <p:sp>
+        <p:nvSpPr>
+          <p:cNvPr id="2" name="Title 1"/>
+          <p:cNvSpPr>
+            <a:spLocks noGrp="1"/>
+          </p:cNvSpPr>
+          <p:nvPr>
+            <p:ph type="title"/>
+          </p:nvPr>
+        </p:nvSpPr>
+        <p:spPr>
+          <a:xfrm>
+            <a:off x="10160" y="56515"/>
+            <a:ext cx="12154535" cy="1212850"/>
+          </a:xfrm>
+        </p:spPr>
+        <p:txBody>
+          <a:bodyPr/>
+          <a:p>
+            <a:r>
+              <a:rPr lang="en-US" altLang="en-US"/>
+              <a:t>D</a:t>
+            </a:r>
+            <a:endParaRPr lang="en-US" altLang="en-US"/>
+          </a:p>
+        </p:txBody>
+      </p:sp>
+      <p:sp>
+        <p:nvSpPr>
+          <p:cNvPr id="3" name="Content Placeholder 2"/>
+          <p:cNvSpPr>
+            <a:spLocks noGrp="1"/>
+          </p:cNvSpPr>
+          <p:nvPr>
+            <p:ph idx="1"/>
+          </p:nvPr>
+        </p:nvSpPr>
+        <p:spPr>
+          <a:xfrm>
+            <a:off x="81915" y="1386205"/>
+            <a:ext cx="12021820" cy="5344160"/>
+          </a:xfrm>
+        </p:spPr>
+        <p:txBody>
+          <a:bodyPr/>
+          <a:p>
+            <a:pPr marL="0" indent="0" algn="just">
+              <a:buFont typeface="+mj-lt"/>
+              <a:buNone/>
             </a:pPr>
             <a:r>
               <a:rPr lang="en-US" altLang="en-US" b="1">
@@ -17542,7 +18006,7 @@
 </p:sld>
 </file>
 
-<file path=ppt/slides/slide25.xml><?xml version="1.0" encoding="utf-8"?>
+<file path=ppt/slides/slide26.xml><?xml version="1.0" encoding="utf-8"?>
 <p:sld xmlns:a="http://schemas.openxmlformats.org/drawingml/2006/main" xmlns:r="http://schemas.openxmlformats.org/officeDocument/2006/relationships" xmlns:p="http://schemas.openxmlformats.org/presentationml/2006/main">
   <p:cSld>
     <p:spTree>
@@ -18353,7 +18817,7 @@
 </p:sld>
 </file>
 
-<file path=ppt/slides/slide26.xml><?xml version="1.0" encoding="utf-8"?>
+<file path=ppt/slides/slide27.xml><?xml version="1.0" encoding="utf-8"?>
 <p:sld xmlns:a="http://schemas.openxmlformats.org/drawingml/2006/main" xmlns:r="http://schemas.openxmlformats.org/officeDocument/2006/relationships" xmlns:p="http://schemas.openxmlformats.org/presentationml/2006/main">
   <p:cSld>
     <p:spTree>
@@ -18727,7 +19191,7 @@
 </p:sld>
 </file>
 
-<file path=ppt/slides/slide27.xml><?xml version="1.0" encoding="utf-8"?>
+<file path=ppt/slides/slide28.xml><?xml version="1.0" encoding="utf-8"?>
 <p:sld xmlns:a="http://schemas.openxmlformats.org/drawingml/2006/main" xmlns:r="http://schemas.openxmlformats.org/officeDocument/2006/relationships" xmlns:p="http://schemas.openxmlformats.org/presentationml/2006/main">
   <p:cSld>
     <p:spTree>
@@ -19172,7 +19636,7 @@
 </p:sld>
 </file>
 
-<file path=ppt/slides/slide28.xml><?xml version="1.0" encoding="utf-8"?>
+<file path=ppt/slides/slide29.xml><?xml version="1.0" encoding="utf-8"?>
 <p:sld xmlns:a="http://schemas.openxmlformats.org/drawingml/2006/main" xmlns:r="http://schemas.openxmlformats.org/officeDocument/2006/relationships" xmlns:p="http://schemas.openxmlformats.org/presentationml/2006/main">
   <p:cSld>
     <p:spTree>
@@ -19617,7 +20081,1091 @@
 </p:sld>
 </file>
 
-<file path=ppt/slides/slide29.xml><?xml version="1.0" encoding="utf-8"?>
+<file path=ppt/slides/slide3.xml><?xml version="1.0" encoding="utf-8"?>
+<p:sld xmlns:a="http://schemas.openxmlformats.org/drawingml/2006/main" xmlns:r="http://schemas.openxmlformats.org/officeDocument/2006/relationships" xmlns:p="http://schemas.openxmlformats.org/presentationml/2006/main">
+  <p:cSld>
+    <p:spTree>
+      <p:nvGrpSpPr>
+        <p:cNvPr id="1" name=""/>
+        <p:cNvGrpSpPr/>
+        <p:nvPr/>
+      </p:nvGrpSpPr>
+      <p:grpSpPr/>
+      <p:sp>
+        <p:nvSpPr>
+          <p:cNvPr id="2" name="Title 1"/>
+          <p:cNvSpPr>
+            <a:spLocks noGrp="1"/>
+          </p:cNvSpPr>
+          <p:nvPr>
+            <p:ph type="title"/>
+          </p:nvPr>
+        </p:nvSpPr>
+        <p:spPr>
+          <a:xfrm>
+            <a:off x="10160" y="56515"/>
+            <a:ext cx="12154535" cy="1212850"/>
+          </a:xfrm>
+        </p:spPr>
+        <p:txBody>
+          <a:bodyPr/>
+          <a:p>
+            <a:endParaRPr lang="en-US"/>
+          </a:p>
+        </p:txBody>
+      </p:sp>
+      <p:sp>
+        <p:nvSpPr>
+          <p:cNvPr id="3" name="Content Placeholder 2"/>
+          <p:cNvSpPr>
+            <a:spLocks noGrp="1"/>
+          </p:cNvSpPr>
+          <p:nvPr>
+            <p:ph idx="1"/>
+          </p:nvPr>
+        </p:nvSpPr>
+        <p:spPr>
+          <a:xfrm>
+            <a:off x="81915" y="1386205"/>
+            <a:ext cx="12021820" cy="5344160"/>
+          </a:xfrm>
+        </p:spPr>
+        <p:txBody>
+          <a:bodyPr/>
+          <a:p>
+            <a:pPr marL="571500" indent="-571500" algn="just">
+              <a:buFont typeface="+mj-lt"/>
+              <a:buAutoNum type="romanUcPeriod"/>
+            </a:pPr>
+            <a:r>
+              <a:rPr lang="en-US" altLang="en-US" b="1" u="sng">
+                <a:latin typeface="Times New Roman" panose="02020603050405020304" charset="0"/>
+                <a:cs typeface="Times New Roman" panose="02020603050405020304" charset="0"/>
+              </a:rPr>
+              <a:t>Structure d'accueil</a:t>
+            </a:r>
+            <a:endParaRPr lang="en-US" altLang="en-US" b="1">
+              <a:latin typeface="Times New Roman" panose="02020603050405020304" charset="0"/>
+              <a:cs typeface="Times New Roman" panose="02020603050405020304" charset="0"/>
+            </a:endParaRPr>
+          </a:p>
+          <a:p>
+            <a:pPr marL="971550" lvl="1" indent="-514350" algn="just">
+              <a:buFont typeface="+mj-lt"/>
+              <a:buAutoNum type="arabicPeriod"/>
+            </a:pPr>
+            <a:r>
+              <a:rPr lang="en-US" altLang="en-US" b="1" u="sng">
+                <a:latin typeface="Times New Roman" panose="02020603050405020304" charset="0"/>
+                <a:cs typeface="Times New Roman" panose="02020603050405020304" charset="0"/>
+              </a:rPr>
+              <a:t>Missions et activités</a:t>
+            </a:r>
+            <a:endParaRPr lang="en-US" altLang="en-US" b="1">
+              <a:latin typeface="Times New Roman" panose="02020603050405020304" charset="0"/>
+              <a:cs typeface="Times New Roman" panose="02020603050405020304" charset="0"/>
+            </a:endParaRPr>
+          </a:p>
+          <a:p>
+            <a:pPr marL="0" indent="0" algn="just">
+              <a:buFont typeface="+mj-lt"/>
+              <a:buNone/>
+            </a:pPr>
+            <a:endParaRPr lang="en-US" altLang="en-US" b="1">
+              <a:latin typeface="Times New Roman" panose="02020603050405020304" charset="0"/>
+              <a:cs typeface="Times New Roman" panose="02020603050405020304" charset="0"/>
+            </a:endParaRPr>
+          </a:p>
+        </p:txBody>
+      </p:sp>
+      <p:sp>
+        <p:nvSpPr>
+          <p:cNvPr id="4" name="Rounded Rectangle 3"/>
+          <p:cNvSpPr/>
+          <p:nvPr/>
+        </p:nvSpPr>
+        <p:spPr>
+          <a:xfrm>
+            <a:off x="82550" y="98425"/>
+            <a:ext cx="2926715" cy="1043940"/>
+          </a:xfrm>
+          <a:prstGeom prst="roundRect">
+            <a:avLst/>
+          </a:prstGeom>
+        </p:spPr>
+        <p:style>
+          <a:lnRef idx="2">
+            <a:schemeClr val="accent5">
+              <a:shade val="50000"/>
+            </a:schemeClr>
+          </a:lnRef>
+          <a:fillRef idx="1">
+            <a:schemeClr val="accent5"/>
+          </a:fillRef>
+          <a:effectRef idx="0">
+            <a:schemeClr val="accent5"/>
+          </a:effectRef>
+          <a:fontRef idx="minor">
+            <a:schemeClr val="lt1"/>
+          </a:fontRef>
+        </p:style>
+        <p:txBody>
+          <a:bodyPr rtlCol="0" anchor="ctr"/>
+          <a:p>
+            <a:pPr algn="ctr"/>
+            <a:r>
+              <a:rPr lang="en-US" altLang="en-US" b="1">
+                <a:latin typeface="Times New Roman" panose="02020603050405020304" charset="0"/>
+                <a:cs typeface="Times New Roman" panose="02020603050405020304" charset="0"/>
+                <a:sym typeface="+mn-ea"/>
+              </a:rPr>
+              <a:t>ENVIRONNEMENT DE TRAVAIL</a:t>
+            </a:r>
+            <a:endParaRPr lang="en-US" altLang="en-US" b="1">
+              <a:latin typeface="Times New Roman" panose="02020603050405020304" charset="0"/>
+              <a:cs typeface="Times New Roman" panose="02020603050405020304" charset="0"/>
+            </a:endParaRPr>
+          </a:p>
+          <a:p>
+            <a:pPr algn="ctr"/>
+            <a:endParaRPr lang="en-US" altLang="en-US" b="1">
+              <a:latin typeface="Times New Roman" panose="02020603050405020304" charset="0"/>
+              <a:cs typeface="Times New Roman" panose="02020603050405020304" charset="0"/>
+            </a:endParaRPr>
+          </a:p>
+        </p:txBody>
+      </p:sp>
+      <p:sp>
+        <p:nvSpPr>
+          <p:cNvPr id="6" name="Rounded Rectangle 5"/>
+          <p:cNvSpPr/>
+          <p:nvPr/>
+        </p:nvSpPr>
+        <p:spPr>
+          <a:xfrm>
+            <a:off x="3093720" y="114300"/>
+            <a:ext cx="2926715" cy="1043940"/>
+          </a:xfrm>
+          <a:prstGeom prst="roundRect">
+            <a:avLst/>
+          </a:prstGeom>
+        </p:spPr>
+        <p:style>
+          <a:lnRef idx="1">
+            <a:schemeClr val="accent3"/>
+          </a:lnRef>
+          <a:fillRef idx="2">
+            <a:schemeClr val="accent3"/>
+          </a:fillRef>
+          <a:effectRef idx="1">
+            <a:schemeClr val="accent3"/>
+          </a:effectRef>
+          <a:fontRef idx="minor">
+            <a:schemeClr val="dk1"/>
+          </a:fontRef>
+        </p:style>
+        <p:txBody>
+          <a:bodyPr rtlCol="0" anchor="ctr"/>
+          <a:p>
+            <a:pPr algn="ctr"/>
+            <a:r>
+              <a:rPr lang="en-US" altLang="en-US" b="1">
+                <a:latin typeface="Times New Roman" panose="02020603050405020304" charset="0"/>
+                <a:cs typeface="Times New Roman" panose="02020603050405020304" charset="0"/>
+                <a:sym typeface="+mn-ea"/>
+              </a:rPr>
+              <a:t>CONCEPTS GÉNÉRAUX DU DOMAINE</a:t>
+            </a:r>
+            <a:endParaRPr lang="en-US" altLang="en-US" b="1">
+              <a:latin typeface="Times New Roman" panose="02020603050405020304" charset="0"/>
+              <a:cs typeface="Times New Roman" panose="02020603050405020304" charset="0"/>
+            </a:endParaRPr>
+          </a:p>
+        </p:txBody>
+      </p:sp>
+      <p:sp>
+        <p:nvSpPr>
+          <p:cNvPr id="7" name="Rounded Rectangle 6"/>
+          <p:cNvSpPr/>
+          <p:nvPr/>
+        </p:nvSpPr>
+        <p:spPr>
+          <a:xfrm>
+            <a:off x="6135370" y="114300"/>
+            <a:ext cx="2926715" cy="1043940"/>
+          </a:xfrm>
+          <a:prstGeom prst="roundRect">
+            <a:avLst/>
+          </a:prstGeom>
+        </p:spPr>
+        <p:style>
+          <a:lnRef idx="1">
+            <a:schemeClr val="accent3"/>
+          </a:lnRef>
+          <a:fillRef idx="2">
+            <a:schemeClr val="accent3"/>
+          </a:fillRef>
+          <a:effectRef idx="1">
+            <a:schemeClr val="accent3"/>
+          </a:effectRef>
+          <a:fontRef idx="minor">
+            <a:schemeClr val="dk1"/>
+          </a:fontRef>
+        </p:style>
+        <p:txBody>
+          <a:bodyPr rtlCol="0" anchor="ctr"/>
+          <a:p>
+            <a:pPr algn="ctr"/>
+            <a:r>
+              <a:rPr lang="en-US" altLang="en-US" b="1">
+                <a:latin typeface="Times New Roman" panose="02020603050405020304" charset="0"/>
+                <a:cs typeface="Times New Roman" panose="02020603050405020304" charset="0"/>
+                <a:sym typeface="+mn-ea"/>
+              </a:rPr>
+              <a:t>CONCEPTION</a:t>
+            </a:r>
+            <a:endParaRPr lang="en-US" altLang="en-US" b="1">
+              <a:latin typeface="Times New Roman" panose="02020603050405020304" charset="0"/>
+              <a:cs typeface="Times New Roman" panose="02020603050405020304" charset="0"/>
+            </a:endParaRPr>
+          </a:p>
+        </p:txBody>
+      </p:sp>
+      <p:sp>
+        <p:nvSpPr>
+          <p:cNvPr id="8" name="Rounded Rectangle 7"/>
+          <p:cNvSpPr/>
+          <p:nvPr/>
+        </p:nvSpPr>
+        <p:spPr>
+          <a:xfrm>
+            <a:off x="9177020" y="114300"/>
+            <a:ext cx="2926715" cy="1043940"/>
+          </a:xfrm>
+          <a:prstGeom prst="roundRect">
+            <a:avLst/>
+          </a:prstGeom>
+        </p:spPr>
+        <p:style>
+          <a:lnRef idx="1">
+            <a:schemeClr val="accent3"/>
+          </a:lnRef>
+          <a:fillRef idx="2">
+            <a:schemeClr val="accent3"/>
+          </a:fillRef>
+          <a:effectRef idx="1">
+            <a:schemeClr val="accent3"/>
+          </a:effectRef>
+          <a:fontRef idx="minor">
+            <a:schemeClr val="dk1"/>
+          </a:fontRef>
+        </p:style>
+        <p:txBody>
+          <a:bodyPr rtlCol="0" anchor="ctr"/>
+          <a:p>
+            <a:pPr algn="ctr"/>
+            <a:r>
+              <a:rPr lang="en-US" altLang="en-US" b="1">
+                <a:latin typeface="Times New Roman" panose="02020603050405020304" charset="0"/>
+                <a:cs typeface="Times New Roman" panose="02020603050405020304" charset="0"/>
+                <a:sym typeface="+mn-ea"/>
+              </a:rPr>
+              <a:t>MISE EN OEUVRE DE LA SOLUTION</a:t>
+            </a:r>
+            <a:endParaRPr lang="en-US" altLang="en-US" b="1">
+              <a:latin typeface="Times New Roman" panose="02020603050405020304" charset="0"/>
+              <a:cs typeface="Times New Roman" panose="02020603050405020304" charset="0"/>
+            </a:endParaRPr>
+          </a:p>
+        </p:txBody>
+      </p:sp>
+      <p:pic>
+        <p:nvPicPr>
+          <p:cNvPr id="13" name="Picture 12" descr="logo_metrika"/>
+          <p:cNvPicPr>
+            <a:picLocks noChangeAspect="1"/>
+          </p:cNvPicPr>
+          <p:nvPr/>
+        </p:nvPicPr>
+        <p:blipFill>
+          <a:blip r:embed="rId1"/>
+          <a:stretch>
+            <a:fillRect/>
+          </a:stretch>
+        </p:blipFill>
+        <p:spPr>
+          <a:xfrm>
+            <a:off x="762635" y="4604385"/>
+            <a:ext cx="2409190" cy="1004570"/>
+          </a:xfrm>
+          <a:prstGeom prst="rect">
+            <a:avLst/>
+          </a:prstGeom>
+        </p:spPr>
+      </p:pic>
+      <p:sp>
+        <p:nvSpPr>
+          <p:cNvPr id="14" name="Oval 13"/>
+          <p:cNvSpPr/>
+          <p:nvPr/>
+        </p:nvSpPr>
+        <p:spPr>
+          <a:xfrm>
+            <a:off x="321310" y="3061335"/>
+            <a:ext cx="3291840" cy="1168400"/>
+          </a:xfrm>
+          <a:prstGeom prst="ellipse">
+            <a:avLst/>
+          </a:prstGeom>
+        </p:spPr>
+        <p:style>
+          <a:lnRef idx="2">
+            <a:schemeClr val="accent5">
+              <a:shade val="50000"/>
+            </a:schemeClr>
+          </a:lnRef>
+          <a:fillRef idx="1">
+            <a:schemeClr val="accent5"/>
+          </a:fillRef>
+          <a:effectRef idx="0">
+            <a:schemeClr val="accent5"/>
+          </a:effectRef>
+          <a:fontRef idx="minor">
+            <a:schemeClr val="lt1"/>
+          </a:fontRef>
+        </p:style>
+        <p:txBody>
+          <a:bodyPr rtlCol="0" anchor="ctr"/>
+          <a:p>
+            <a:pPr algn="ctr"/>
+            <a:r>
+              <a:rPr lang="en-US" altLang="en-US" sz="2200" b="1">
+                <a:latin typeface="Times New Roman" panose="02020603050405020304" charset="0"/>
+                <a:cs typeface="Times New Roman" panose="02020603050405020304" charset="0"/>
+              </a:rPr>
+              <a:t>Qui est Métrika-IDB ?</a:t>
+            </a:r>
+            <a:endParaRPr lang="en-US" altLang="en-US" sz="2200" b="1">
+              <a:latin typeface="Times New Roman" panose="02020603050405020304" charset="0"/>
+              <a:cs typeface="Times New Roman" panose="02020603050405020304" charset="0"/>
+            </a:endParaRPr>
+          </a:p>
+        </p:txBody>
+      </p:sp>
+      <p:sp>
+        <p:nvSpPr>
+          <p:cNvPr id="17" name="Rounded Rectangular Callout 16"/>
+          <p:cNvSpPr/>
+          <p:nvPr/>
+        </p:nvSpPr>
+        <p:spPr>
+          <a:xfrm>
+            <a:off x="5171440" y="3061335"/>
+            <a:ext cx="6993255" cy="3669030"/>
+          </a:xfrm>
+          <a:prstGeom prst="wedgeRoundRectCallout">
+            <a:avLst>
+              <a:gd name="adj1" fmla="val -72219"/>
+              <a:gd name="adj2" fmla="val -35064"/>
+              <a:gd name="adj3" fmla="val 16667"/>
+            </a:avLst>
+          </a:prstGeom>
+        </p:spPr>
+        <p:style>
+          <a:lnRef idx="1">
+            <a:schemeClr val="accent6"/>
+          </a:lnRef>
+          <a:fillRef idx="3">
+            <a:schemeClr val="accent6"/>
+          </a:fillRef>
+          <a:effectRef idx="2">
+            <a:schemeClr val="accent6"/>
+          </a:effectRef>
+          <a:fontRef idx="minor">
+            <a:schemeClr val="lt1"/>
+          </a:fontRef>
+        </p:style>
+        <p:txBody>
+          <a:bodyPr rtlCol="0" anchor="ctr"/>
+          <a:p>
+            <a:pPr algn="just"/>
+            <a:r>
+              <a:rPr lang="en-US" altLang="en-US" sz="2400">
+                <a:solidFill>
+                  <a:schemeClr val="tx1"/>
+                </a:solidFill>
+                <a:latin typeface="Times New Roman" panose="02020603050405020304" charset="0"/>
+                <a:cs typeface="Times New Roman" panose="02020603050405020304" charset="0"/>
+              </a:rPr>
+              <a:t>	Entreprise informatique opérant dans :  </a:t>
+            </a:r>
+            <a:endParaRPr lang="en-US" altLang="en-US" sz="2400">
+              <a:solidFill>
+                <a:schemeClr val="tx1"/>
+              </a:solidFill>
+              <a:latin typeface="Times New Roman" panose="02020603050405020304" charset="0"/>
+              <a:cs typeface="Times New Roman" panose="02020603050405020304" charset="0"/>
+            </a:endParaRPr>
+          </a:p>
+          <a:p>
+            <a:pPr algn="just"/>
+            <a:endParaRPr lang="en-US" altLang="en-US" sz="2400">
+              <a:solidFill>
+                <a:schemeClr val="tx1"/>
+              </a:solidFill>
+              <a:latin typeface="Times New Roman" panose="02020603050405020304" charset="0"/>
+              <a:cs typeface="Times New Roman" panose="02020603050405020304" charset="0"/>
+            </a:endParaRPr>
+          </a:p>
+          <a:p>
+            <a:pPr marL="285750" indent="-285750" algn="just">
+              <a:buFont typeface="Arial" panose="020B0604020202020204" pitchFamily="34" charset="0"/>
+              <a:buChar char="•"/>
+            </a:pPr>
+            <a:r>
+              <a:rPr lang="en-US" altLang="en-US" sz="2400" b="1">
+                <a:solidFill>
+                  <a:schemeClr val="tx1"/>
+                </a:solidFill>
+                <a:latin typeface="Times New Roman" panose="02020603050405020304" charset="0"/>
+                <a:cs typeface="Times New Roman" panose="02020603050405020304" charset="0"/>
+                <a:sym typeface="+mn-ea"/>
+              </a:rPr>
+              <a:t>Intégration de solutions informatiques et édition de logiciels</a:t>
+            </a:r>
+            <a:r>
+              <a:rPr lang="en-US" altLang="en-US" sz="2400" b="1">
+                <a:solidFill>
+                  <a:schemeClr val="tx1"/>
+                </a:solidFill>
+                <a:latin typeface="Times New Roman" panose="02020603050405020304" charset="0"/>
+                <a:cs typeface="Times New Roman" panose="02020603050405020304" charset="0"/>
+              </a:rPr>
+              <a:t> </a:t>
+            </a:r>
+            <a:endParaRPr lang="en-US" altLang="en-US" sz="2400" b="1">
+              <a:solidFill>
+                <a:schemeClr val="tx1"/>
+              </a:solidFill>
+              <a:latin typeface="Times New Roman" panose="02020603050405020304" charset="0"/>
+              <a:cs typeface="Times New Roman" panose="02020603050405020304" charset="0"/>
+            </a:endParaRPr>
+          </a:p>
+          <a:p>
+            <a:pPr indent="0" algn="just">
+              <a:buFont typeface="Arial" panose="020B0604020202020204" pitchFamily="34" charset="0"/>
+              <a:buNone/>
+            </a:pPr>
+            <a:endParaRPr lang="en-US" altLang="en-US" sz="2400" b="1">
+              <a:solidFill>
+                <a:schemeClr val="tx1"/>
+              </a:solidFill>
+              <a:latin typeface="Times New Roman" panose="02020603050405020304" charset="0"/>
+              <a:cs typeface="Times New Roman" panose="02020603050405020304" charset="0"/>
+            </a:endParaRPr>
+          </a:p>
+          <a:p>
+            <a:pPr marL="285750" indent="-285750" algn="just">
+              <a:buFont typeface="Arial" panose="020B0604020202020204" pitchFamily="34" charset="0"/>
+              <a:buChar char="•"/>
+            </a:pPr>
+            <a:r>
+              <a:rPr lang="en-US" altLang="en-US" sz="2400" b="1">
+                <a:solidFill>
+                  <a:schemeClr val="tx1"/>
+                </a:solidFill>
+                <a:latin typeface="Times New Roman" panose="02020603050405020304" charset="0"/>
+                <a:cs typeface="Times New Roman" panose="02020603050405020304" charset="0"/>
+              </a:rPr>
+              <a:t>Encadrement de la recherche et des tâches de développement</a:t>
+            </a:r>
+            <a:endParaRPr lang="en-US" altLang="en-US" sz="2400" b="1">
+              <a:solidFill>
+                <a:schemeClr val="tx1"/>
+              </a:solidFill>
+              <a:latin typeface="Times New Roman" panose="02020603050405020304" charset="0"/>
+              <a:cs typeface="Times New Roman" panose="02020603050405020304" charset="0"/>
+            </a:endParaRPr>
+          </a:p>
+          <a:p>
+            <a:pPr indent="0" algn="just">
+              <a:buFont typeface="Arial" panose="020B0604020202020204" pitchFamily="34" charset="0"/>
+              <a:buNone/>
+            </a:pPr>
+            <a:endParaRPr lang="en-US" altLang="en-US" sz="2400" b="1">
+              <a:solidFill>
+                <a:schemeClr val="tx1"/>
+              </a:solidFill>
+              <a:latin typeface="Times New Roman" panose="02020603050405020304" charset="0"/>
+              <a:cs typeface="Times New Roman" panose="02020603050405020304" charset="0"/>
+            </a:endParaRPr>
+          </a:p>
+          <a:p>
+            <a:pPr marL="285750" indent="-285750" algn="just">
+              <a:buFont typeface="Arial" panose="020B0604020202020204" pitchFamily="34" charset="0"/>
+              <a:buChar char="•"/>
+            </a:pPr>
+            <a:r>
+              <a:rPr lang="en-US" altLang="en-US" sz="2400" b="1">
+                <a:solidFill>
+                  <a:schemeClr val="tx1"/>
+                </a:solidFill>
+                <a:latin typeface="Times New Roman" panose="02020603050405020304" charset="0"/>
+                <a:cs typeface="Times New Roman" panose="02020603050405020304" charset="0"/>
+              </a:rPr>
+              <a:t>Participation aux tests de nouveauté</a:t>
+            </a:r>
+            <a:endParaRPr lang="en-US" altLang="en-US" sz="2400" b="1">
+              <a:solidFill>
+                <a:schemeClr val="tx1"/>
+              </a:solidFill>
+              <a:latin typeface="Times New Roman" panose="02020603050405020304" charset="0"/>
+              <a:cs typeface="Times New Roman" panose="02020603050405020304" charset="0"/>
+            </a:endParaRPr>
+          </a:p>
+          <a:p>
+            <a:pPr algn="just"/>
+            <a:r>
+              <a:rPr lang="en-US" altLang="en-US" sz="2400">
+                <a:solidFill>
+                  <a:schemeClr val="tx1"/>
+                </a:solidFill>
+                <a:latin typeface="Times New Roman" panose="02020603050405020304" charset="0"/>
+                <a:cs typeface="Times New Roman" panose="02020603050405020304" charset="0"/>
+              </a:rPr>
+              <a:t> </a:t>
+            </a:r>
+            <a:endParaRPr lang="en-US" altLang="en-US" sz="2400">
+              <a:solidFill>
+                <a:schemeClr val="tx1"/>
+              </a:solidFill>
+              <a:latin typeface="Times New Roman" panose="02020603050405020304" charset="0"/>
+              <a:cs typeface="Times New Roman" panose="02020603050405020304" charset="0"/>
+            </a:endParaRPr>
+          </a:p>
+        </p:txBody>
+      </p:sp>
+      <p:sp>
+        <p:nvSpPr>
+          <p:cNvPr id="9" name="Rounded Rectangular Callout 8"/>
+          <p:cNvSpPr/>
+          <p:nvPr/>
+        </p:nvSpPr>
+        <p:spPr>
+          <a:xfrm>
+            <a:off x="4902200" y="1668780"/>
+            <a:ext cx="6909435" cy="882650"/>
+          </a:xfrm>
+          <a:prstGeom prst="wedgeRoundRectCallout">
+            <a:avLst>
+              <a:gd name="adj1" fmla="val -99308"/>
+              <a:gd name="adj2" fmla="val 96425"/>
+              <a:gd name="adj3" fmla="val 16667"/>
+            </a:avLst>
+          </a:prstGeom>
+        </p:spPr>
+        <p:style>
+          <a:lnRef idx="2">
+            <a:schemeClr val="accent6">
+              <a:shade val="50000"/>
+            </a:schemeClr>
+          </a:lnRef>
+          <a:fillRef idx="1">
+            <a:schemeClr val="accent6"/>
+          </a:fillRef>
+          <a:effectRef idx="0">
+            <a:schemeClr val="accent6"/>
+          </a:effectRef>
+          <a:fontRef idx="minor">
+            <a:schemeClr val="lt1"/>
+          </a:fontRef>
+        </p:style>
+        <p:txBody>
+          <a:bodyPr rtlCol="0" anchor="ctr"/>
+          <a:p>
+            <a:pPr algn="just"/>
+            <a:r>
+              <a:rPr lang="en-US" altLang="en-US" sz="2400" b="1">
+                <a:latin typeface="Times New Roman" panose="02020603050405020304" charset="0"/>
+                <a:cs typeface="Times New Roman" panose="02020603050405020304" charset="0"/>
+              </a:rPr>
+              <a:t>Naissance :</a:t>
+            </a:r>
+            <a:r>
+              <a:rPr lang="en-US" altLang="en-US" sz="2400" b="1">
+                <a:solidFill>
+                  <a:schemeClr val="tx1"/>
+                </a:solidFill>
+                <a:latin typeface="Times New Roman" panose="02020603050405020304" charset="0"/>
+                <a:cs typeface="Times New Roman" panose="02020603050405020304" charset="0"/>
+              </a:rPr>
+              <a:t> 1995</a:t>
+            </a:r>
+            <a:endParaRPr lang="en-US" altLang="en-US" sz="2400" b="1">
+              <a:solidFill>
+                <a:schemeClr val="tx1"/>
+              </a:solidFill>
+              <a:latin typeface="Times New Roman" panose="02020603050405020304" charset="0"/>
+              <a:cs typeface="Times New Roman" panose="02020603050405020304" charset="0"/>
+            </a:endParaRPr>
+          </a:p>
+          <a:p>
+            <a:pPr algn="just"/>
+            <a:r>
+              <a:rPr lang="en-US" altLang="en-US" sz="2400" b="1">
+                <a:latin typeface="Times New Roman" panose="02020603050405020304" charset="0"/>
+                <a:cs typeface="Times New Roman" panose="02020603050405020304" charset="0"/>
+              </a:rPr>
+              <a:t>Siège : </a:t>
+            </a:r>
+            <a:r>
+              <a:rPr lang="en-US" altLang="en-US" sz="2400" b="1">
+                <a:solidFill>
+                  <a:schemeClr val="tx1"/>
+                </a:solidFill>
+                <a:latin typeface="Times New Roman" panose="02020603050405020304" charset="0"/>
+                <a:cs typeface="Times New Roman" panose="02020603050405020304" charset="0"/>
+              </a:rPr>
+              <a:t>Immeuble Atlantis II ACAE, LIBREVILLE</a:t>
+            </a:r>
+            <a:endParaRPr lang="en-US" altLang="en-US" sz="2400" b="1">
+              <a:solidFill>
+                <a:schemeClr val="tx1"/>
+              </a:solidFill>
+              <a:latin typeface="Times New Roman" panose="02020603050405020304" charset="0"/>
+              <a:cs typeface="Times New Roman" panose="02020603050405020304" charset="0"/>
+            </a:endParaRPr>
+          </a:p>
+        </p:txBody>
+      </p:sp>
+    </p:spTree>
+  </p:cSld>
+  <p:clrMapOvr>
+    <a:masterClrMapping/>
+  </p:clrMapOvr>
+  <p:transition>
+    <p:push dir="u"/>
+  </p:transition>
+  <p:timing>
+    <p:tnLst>
+      <p:par>
+        <p:cTn id="1" dur="indefinite" restart="never" nodeType="tmRoot">
+          <p:childTnLst>
+            <p:seq concurrent="1" nextAc="seek">
+              <p:cTn id="2" dur="indefinite" nodeType="mainSeq">
+                <p:childTnLst>
+                  <p:par>
+                    <p:cTn id="3" fill="hold">
+                      <p:stCondLst>
+                        <p:cond delay="indefinite"/>
+                        <p:cond evt="onBegin" delay="0">
+                          <p:tn val="2"/>
+                        </p:cond>
+                      </p:stCondLst>
+                      <p:childTnLst>
+                        <p:par>
+                          <p:cTn id="4" fill="hold">
+                            <p:stCondLst>
+                              <p:cond delay="0"/>
+                            </p:stCondLst>
+                            <p:childTnLst>
+                              <p:par>
+                                <p:cTn id="5" presetID="42" presetClass="entr" presetSubtype="0" fill="hold" grpId="0" nodeType="afterEffect">
+                                  <p:stCondLst>
+                                    <p:cond delay="0"/>
+                                  </p:stCondLst>
+                                  <p:childTnLst>
+                                    <p:set>
+                                      <p:cBhvr>
+                                        <p:cTn id="6" dur="500" fill="hold">
+                                          <p:stCondLst>
+                                            <p:cond delay="0"/>
+                                          </p:stCondLst>
+                                        </p:cTn>
+                                        <p:tgtEl>
+                                          <p:spTgt spid="9"/>
+                                        </p:tgtEl>
+                                        <p:attrNameLst>
+                                          <p:attrName>style.visibility</p:attrName>
+                                        </p:attrNameLst>
+                                      </p:cBhvr>
+                                      <p:to>
+                                        <p:strVal val="visible"/>
+                                      </p:to>
+                                    </p:set>
+                                    <p:animEffect transition="in" filter="fade">
+                                      <p:cBhvr>
+                                        <p:cTn id="7" dur="500"/>
+                                        <p:tgtEl>
+                                          <p:spTgt spid="9"/>
+                                        </p:tgtEl>
+                                      </p:cBhvr>
+                                    </p:animEffect>
+                                    <p:anim calcmode="lin" valueType="num">
+                                      <p:cBhvr>
+                                        <p:cTn id="8" dur="500" fill="hold"/>
+                                        <p:tgtEl>
+                                          <p:spTgt spid="9"/>
+                                        </p:tgtEl>
+                                        <p:attrNameLst>
+                                          <p:attrName>ppt_x</p:attrName>
+                                        </p:attrNameLst>
+                                      </p:cBhvr>
+                                      <p:tavLst>
+                                        <p:tav tm="0">
+                                          <p:val>
+                                            <p:strVal val="#ppt_x"/>
+                                          </p:val>
+                                        </p:tav>
+                                        <p:tav tm="100000">
+                                          <p:val>
+                                            <p:strVal val="#ppt_x"/>
+                                          </p:val>
+                                        </p:tav>
+                                      </p:tavLst>
+                                    </p:anim>
+                                    <p:anim calcmode="lin" valueType="num">
+                                      <p:cBhvr>
+                                        <p:cTn id="9" dur="500" fill="hold"/>
+                                        <p:tgtEl>
+                                          <p:spTgt spid="9"/>
+                                        </p:tgtEl>
+                                        <p:attrNameLst>
+                                          <p:attrName>ppt_y</p:attrName>
+                                        </p:attrNameLst>
+                                      </p:cBhvr>
+                                      <p:tavLst>
+                                        <p:tav tm="0">
+                                          <p:val>
+                                            <p:strVal val="#ppt_y+.1"/>
+                                          </p:val>
+                                        </p:tav>
+                                        <p:tav tm="100000">
+                                          <p:val>
+                                            <p:strVal val="#ppt_y"/>
+                                          </p:val>
+                                        </p:tav>
+                                      </p:tavLst>
+                                    </p:anim>
+                                  </p:childTnLst>
+                                </p:cTn>
+                              </p:par>
+                            </p:childTnLst>
+                          </p:cTn>
+                        </p:par>
+                        <p:par>
+                          <p:cTn id="10" fill="hold">
+                            <p:stCondLst>
+                              <p:cond delay="500"/>
+                            </p:stCondLst>
+                            <p:childTnLst>
+                              <p:par>
+                                <p:cTn id="11" presetID="42" presetClass="entr" presetSubtype="0" fill="hold" grpId="0" nodeType="afterEffect">
+                                  <p:stCondLst>
+                                    <p:cond delay="0"/>
+                                  </p:stCondLst>
+                                  <p:childTnLst>
+                                    <p:set>
+                                      <p:cBhvr>
+                                        <p:cTn id="12" dur="1" fill="hold">
+                                          <p:stCondLst>
+                                            <p:cond delay="0"/>
+                                          </p:stCondLst>
+                                        </p:cTn>
+                                        <p:tgtEl>
+                                          <p:spTgt spid="14"/>
+                                        </p:tgtEl>
+                                        <p:attrNameLst>
+                                          <p:attrName>style.visibility</p:attrName>
+                                        </p:attrNameLst>
+                                      </p:cBhvr>
+                                      <p:to>
+                                        <p:strVal val="visible"/>
+                                      </p:to>
+                                    </p:set>
+                                    <p:animEffect transition="in" filter="fade">
+                                      <p:cBhvr>
+                                        <p:cTn id="13" dur="1000"/>
+                                        <p:tgtEl>
+                                          <p:spTgt spid="14"/>
+                                        </p:tgtEl>
+                                      </p:cBhvr>
+                                    </p:animEffect>
+                                    <p:anim calcmode="lin" valueType="num">
+                                      <p:cBhvr>
+                                        <p:cTn id="14" dur="1000" fill="hold"/>
+                                        <p:tgtEl>
+                                          <p:spTgt spid="14"/>
+                                        </p:tgtEl>
+                                        <p:attrNameLst>
+                                          <p:attrName>ppt_x</p:attrName>
+                                        </p:attrNameLst>
+                                      </p:cBhvr>
+                                      <p:tavLst>
+                                        <p:tav tm="0">
+                                          <p:val>
+                                            <p:strVal val="#ppt_x"/>
+                                          </p:val>
+                                        </p:tav>
+                                        <p:tav tm="100000">
+                                          <p:val>
+                                            <p:strVal val="#ppt_x"/>
+                                          </p:val>
+                                        </p:tav>
+                                      </p:tavLst>
+                                    </p:anim>
+                                    <p:anim calcmode="lin" valueType="num">
+                                      <p:cBhvr>
+                                        <p:cTn id="15" dur="1000" fill="hold"/>
+                                        <p:tgtEl>
+                                          <p:spTgt spid="14"/>
+                                        </p:tgtEl>
+                                        <p:attrNameLst>
+                                          <p:attrName>ppt_y</p:attrName>
+                                        </p:attrNameLst>
+                                      </p:cBhvr>
+                                      <p:tavLst>
+                                        <p:tav tm="0">
+                                          <p:val>
+                                            <p:strVal val="#ppt_y+.1"/>
+                                          </p:val>
+                                        </p:tav>
+                                        <p:tav tm="100000">
+                                          <p:val>
+                                            <p:strVal val="#ppt_y"/>
+                                          </p:val>
+                                        </p:tav>
+                                      </p:tavLst>
+                                    </p:anim>
+                                  </p:childTnLst>
+                                </p:cTn>
+                              </p:par>
+                            </p:childTnLst>
+                          </p:cTn>
+                        </p:par>
+                        <p:par>
+                          <p:cTn id="16" fill="hold">
+                            <p:stCondLst>
+                              <p:cond delay="1500"/>
+                            </p:stCondLst>
+                            <p:childTnLst>
+                              <p:par>
+                                <p:cTn id="17" presetID="42" presetClass="entr" presetSubtype="0" fill="hold" nodeType="afterEffect">
+                                  <p:stCondLst>
+                                    <p:cond delay="0"/>
+                                  </p:stCondLst>
+                                  <p:childTnLst>
+                                    <p:set>
+                                      <p:cBhvr>
+                                        <p:cTn id="18" dur="1" fill="hold">
+                                          <p:stCondLst>
+                                            <p:cond delay="0"/>
+                                          </p:stCondLst>
+                                        </p:cTn>
+                                        <p:tgtEl>
+                                          <p:spTgt spid="13"/>
+                                        </p:tgtEl>
+                                        <p:attrNameLst>
+                                          <p:attrName>style.visibility</p:attrName>
+                                        </p:attrNameLst>
+                                      </p:cBhvr>
+                                      <p:to>
+                                        <p:strVal val="visible"/>
+                                      </p:to>
+                                    </p:set>
+                                    <p:animEffect transition="in" filter="fade">
+                                      <p:cBhvr>
+                                        <p:cTn id="19" dur="1000"/>
+                                        <p:tgtEl>
+                                          <p:spTgt spid="13"/>
+                                        </p:tgtEl>
+                                      </p:cBhvr>
+                                    </p:animEffect>
+                                    <p:anim calcmode="lin" valueType="num">
+                                      <p:cBhvr>
+                                        <p:cTn id="20" dur="1000" fill="hold"/>
+                                        <p:tgtEl>
+                                          <p:spTgt spid="13"/>
+                                        </p:tgtEl>
+                                        <p:attrNameLst>
+                                          <p:attrName>ppt_x</p:attrName>
+                                        </p:attrNameLst>
+                                      </p:cBhvr>
+                                      <p:tavLst>
+                                        <p:tav tm="0">
+                                          <p:val>
+                                            <p:strVal val="#ppt_x"/>
+                                          </p:val>
+                                        </p:tav>
+                                        <p:tav tm="100000">
+                                          <p:val>
+                                            <p:strVal val="#ppt_x"/>
+                                          </p:val>
+                                        </p:tav>
+                                      </p:tavLst>
+                                    </p:anim>
+                                    <p:anim calcmode="lin" valueType="num">
+                                      <p:cBhvr>
+                                        <p:cTn id="21" dur="1000" fill="hold"/>
+                                        <p:tgtEl>
+                                          <p:spTgt spid="13"/>
+                                        </p:tgtEl>
+                                        <p:attrNameLst>
+                                          <p:attrName>ppt_y</p:attrName>
+                                        </p:attrNameLst>
+                                      </p:cBhvr>
+                                      <p:tavLst>
+                                        <p:tav tm="0">
+                                          <p:val>
+                                            <p:strVal val="#ppt_y+.1"/>
+                                          </p:val>
+                                        </p:tav>
+                                        <p:tav tm="100000">
+                                          <p:val>
+                                            <p:strVal val="#ppt_y"/>
+                                          </p:val>
+                                        </p:tav>
+                                      </p:tavLst>
+                                    </p:anim>
+                                  </p:childTnLst>
+                                </p:cTn>
+                              </p:par>
+                            </p:childTnLst>
+                          </p:cTn>
+                        </p:par>
+                      </p:childTnLst>
+                    </p:cTn>
+                  </p:par>
+                  <p:par>
+                    <p:cTn id="22" fill="hold">
+                      <p:stCondLst>
+                        <p:cond delay="indefinite"/>
+                      </p:stCondLst>
+                      <p:childTnLst>
+                        <p:par>
+                          <p:cTn id="23" fill="hold">
+                            <p:stCondLst>
+                              <p:cond delay="0"/>
+                            </p:stCondLst>
+                            <p:childTnLst>
+                              <p:par>
+                                <p:cTn id="24" presetID="42" presetClass="entr" presetSubtype="0" fill="hold" grpId="0" nodeType="clickEffect">
+                                  <p:stCondLst>
+                                    <p:cond delay="0"/>
+                                  </p:stCondLst>
+                                  <p:childTnLst>
+                                    <p:set>
+                                      <p:cBhvr>
+                                        <p:cTn id="25" dur="500" fill="hold">
+                                          <p:stCondLst>
+                                            <p:cond delay="0"/>
+                                          </p:stCondLst>
+                                        </p:cTn>
+                                        <p:tgtEl>
+                                          <p:spTgt spid="17"/>
+                                        </p:tgtEl>
+                                        <p:attrNameLst>
+                                          <p:attrName>style.visibility</p:attrName>
+                                        </p:attrNameLst>
+                                      </p:cBhvr>
+                                      <p:to>
+                                        <p:strVal val="visible"/>
+                                      </p:to>
+                                    </p:set>
+                                    <p:animEffect transition="in" filter="fade">
+                                      <p:cBhvr>
+                                        <p:cTn id="26" dur="500"/>
+                                        <p:tgtEl>
+                                          <p:spTgt spid="17"/>
+                                        </p:tgtEl>
+                                      </p:cBhvr>
+                                    </p:animEffect>
+                                    <p:anim calcmode="lin" valueType="num">
+                                      <p:cBhvr>
+                                        <p:cTn id="27" dur="500" fill="hold"/>
+                                        <p:tgtEl>
+                                          <p:spTgt spid="17"/>
+                                        </p:tgtEl>
+                                        <p:attrNameLst>
+                                          <p:attrName>ppt_x</p:attrName>
+                                        </p:attrNameLst>
+                                      </p:cBhvr>
+                                      <p:tavLst>
+                                        <p:tav tm="0">
+                                          <p:val>
+                                            <p:strVal val="#ppt_x"/>
+                                          </p:val>
+                                        </p:tav>
+                                        <p:tav tm="100000">
+                                          <p:val>
+                                            <p:strVal val="#ppt_x"/>
+                                          </p:val>
+                                        </p:tav>
+                                      </p:tavLst>
+                                    </p:anim>
+                                    <p:anim calcmode="lin" valueType="num">
+                                      <p:cBhvr>
+                                        <p:cTn id="28" dur="500" fill="hold"/>
+                                        <p:tgtEl>
+                                          <p:spTgt spid="17"/>
+                                        </p:tgtEl>
+                                        <p:attrNameLst>
+                                          <p:attrName>ppt_y</p:attrName>
+                                        </p:attrNameLst>
+                                      </p:cBhvr>
+                                      <p:tavLst>
+                                        <p:tav tm="0">
+                                          <p:val>
+                                            <p:strVal val="#ppt_y+.1"/>
+                                          </p:val>
+                                        </p:tav>
+                                        <p:tav tm="100000">
+                                          <p:val>
+                                            <p:strVal val="#ppt_y"/>
+                                          </p:val>
+                                        </p:tav>
+                                      </p:tavLst>
+                                    </p:anim>
+                                  </p:childTnLst>
+                                </p:cTn>
+                              </p:par>
+                            </p:childTnLst>
+                          </p:cTn>
+                        </p:par>
+                      </p:childTnLst>
+                    </p:cTn>
+                  </p:par>
+                </p:childTnLst>
+              </p:cTn>
+              <p:prevCondLst>
+                <p:cond evt="onPrev" delay="0">
+                  <p:tgtEl>
+                    <p:sldTgt/>
+                  </p:tgtEl>
+                </p:cond>
+              </p:prevCondLst>
+              <p:nextCondLst>
+                <p:cond evt="onNext" delay="0">
+                  <p:tgtEl>
+                    <p:sldTgt/>
+                  </p:tgtEl>
+                </p:cond>
+              </p:nextCondLst>
+            </p:seq>
+          </p:childTnLst>
+        </p:cTn>
+      </p:par>
+    </p:tnLst>
+    <p:bldLst>
+      <p:bldP spid="9" grpId="0" animBg="1"/>
+      <p:bldP spid="14" grpId="0" animBg="1"/>
+      <p:bldP spid="17" grpId="0" animBg="1"/>
+    </p:bldLst>
+  </p:timing>
+</p:sld>
+</file>
+
+<file path=ppt/slides/slide30.xml><?xml version="1.0" encoding="utf-8"?>
 <p:sld xmlns:a="http://schemas.openxmlformats.org/drawingml/2006/main" xmlns:r="http://schemas.openxmlformats.org/officeDocument/2006/relationships" xmlns:p="http://schemas.openxmlformats.org/presentationml/2006/main">
   <p:cSld>
     <p:spTree>
@@ -20792,1091 +22340,7 @@
 </p:sld>
 </file>
 
-<file path=ppt/slides/slide3.xml><?xml version="1.0" encoding="utf-8"?>
-<p:sld xmlns:a="http://schemas.openxmlformats.org/drawingml/2006/main" xmlns:r="http://schemas.openxmlformats.org/officeDocument/2006/relationships" xmlns:p="http://schemas.openxmlformats.org/presentationml/2006/main">
-  <p:cSld>
-    <p:spTree>
-      <p:nvGrpSpPr>
-        <p:cNvPr id="1" name=""/>
-        <p:cNvGrpSpPr/>
-        <p:nvPr/>
-      </p:nvGrpSpPr>
-      <p:grpSpPr/>
-      <p:sp>
-        <p:nvSpPr>
-          <p:cNvPr id="2" name="Title 1"/>
-          <p:cNvSpPr>
-            <a:spLocks noGrp="1"/>
-          </p:cNvSpPr>
-          <p:nvPr>
-            <p:ph type="title"/>
-          </p:nvPr>
-        </p:nvSpPr>
-        <p:spPr>
-          <a:xfrm>
-            <a:off x="10160" y="56515"/>
-            <a:ext cx="12154535" cy="1212850"/>
-          </a:xfrm>
-        </p:spPr>
-        <p:txBody>
-          <a:bodyPr/>
-          <a:p>
-            <a:endParaRPr lang="en-US"/>
-          </a:p>
-        </p:txBody>
-      </p:sp>
-      <p:sp>
-        <p:nvSpPr>
-          <p:cNvPr id="3" name="Content Placeholder 2"/>
-          <p:cNvSpPr>
-            <a:spLocks noGrp="1"/>
-          </p:cNvSpPr>
-          <p:nvPr>
-            <p:ph idx="1"/>
-          </p:nvPr>
-        </p:nvSpPr>
-        <p:spPr>
-          <a:xfrm>
-            <a:off x="81915" y="1386205"/>
-            <a:ext cx="12021820" cy="5344160"/>
-          </a:xfrm>
-        </p:spPr>
-        <p:txBody>
-          <a:bodyPr/>
-          <a:p>
-            <a:pPr marL="571500" indent="-571500" algn="just">
-              <a:buFont typeface="+mj-lt"/>
-              <a:buAutoNum type="romanUcPeriod"/>
-            </a:pPr>
-            <a:r>
-              <a:rPr lang="en-US" altLang="en-US" b="1" u="sng">
-                <a:latin typeface="Times New Roman" panose="02020603050405020304" charset="0"/>
-                <a:cs typeface="Times New Roman" panose="02020603050405020304" charset="0"/>
-              </a:rPr>
-              <a:t>Structure d'accueil</a:t>
-            </a:r>
-            <a:endParaRPr lang="en-US" altLang="en-US" b="1">
-              <a:latin typeface="Times New Roman" panose="02020603050405020304" charset="0"/>
-              <a:cs typeface="Times New Roman" panose="02020603050405020304" charset="0"/>
-            </a:endParaRPr>
-          </a:p>
-          <a:p>
-            <a:pPr marL="971550" lvl="1" indent="-514350" algn="just">
-              <a:buFont typeface="+mj-lt"/>
-              <a:buAutoNum type="arabicPeriod"/>
-            </a:pPr>
-            <a:r>
-              <a:rPr lang="en-US" altLang="en-US" b="1" u="sng">
-                <a:latin typeface="Times New Roman" panose="02020603050405020304" charset="0"/>
-                <a:cs typeface="Times New Roman" panose="02020603050405020304" charset="0"/>
-              </a:rPr>
-              <a:t>Missions et activités</a:t>
-            </a:r>
-            <a:endParaRPr lang="en-US" altLang="en-US" b="1">
-              <a:latin typeface="Times New Roman" panose="02020603050405020304" charset="0"/>
-              <a:cs typeface="Times New Roman" panose="02020603050405020304" charset="0"/>
-            </a:endParaRPr>
-          </a:p>
-          <a:p>
-            <a:pPr marL="0" indent="0" algn="just">
-              <a:buFont typeface="+mj-lt"/>
-              <a:buNone/>
-            </a:pPr>
-            <a:endParaRPr lang="en-US" altLang="en-US" b="1">
-              <a:latin typeface="Times New Roman" panose="02020603050405020304" charset="0"/>
-              <a:cs typeface="Times New Roman" panose="02020603050405020304" charset="0"/>
-            </a:endParaRPr>
-          </a:p>
-        </p:txBody>
-      </p:sp>
-      <p:sp>
-        <p:nvSpPr>
-          <p:cNvPr id="4" name="Rounded Rectangle 3"/>
-          <p:cNvSpPr/>
-          <p:nvPr/>
-        </p:nvSpPr>
-        <p:spPr>
-          <a:xfrm>
-            <a:off x="82550" y="98425"/>
-            <a:ext cx="2926715" cy="1043940"/>
-          </a:xfrm>
-          <a:prstGeom prst="roundRect">
-            <a:avLst/>
-          </a:prstGeom>
-        </p:spPr>
-        <p:style>
-          <a:lnRef idx="2">
-            <a:schemeClr val="accent5">
-              <a:shade val="50000"/>
-            </a:schemeClr>
-          </a:lnRef>
-          <a:fillRef idx="1">
-            <a:schemeClr val="accent5"/>
-          </a:fillRef>
-          <a:effectRef idx="0">
-            <a:schemeClr val="accent5"/>
-          </a:effectRef>
-          <a:fontRef idx="minor">
-            <a:schemeClr val="lt1"/>
-          </a:fontRef>
-        </p:style>
-        <p:txBody>
-          <a:bodyPr rtlCol="0" anchor="ctr"/>
-          <a:p>
-            <a:pPr algn="ctr"/>
-            <a:r>
-              <a:rPr lang="en-US" altLang="en-US" b="1">
-                <a:latin typeface="Times New Roman" panose="02020603050405020304" charset="0"/>
-                <a:cs typeface="Times New Roman" panose="02020603050405020304" charset="0"/>
-                <a:sym typeface="+mn-ea"/>
-              </a:rPr>
-              <a:t>ENVIRONNEMENT DE TRAVAIL</a:t>
-            </a:r>
-            <a:endParaRPr lang="en-US" altLang="en-US" b="1">
-              <a:latin typeface="Times New Roman" panose="02020603050405020304" charset="0"/>
-              <a:cs typeface="Times New Roman" panose="02020603050405020304" charset="0"/>
-            </a:endParaRPr>
-          </a:p>
-          <a:p>
-            <a:pPr algn="ctr"/>
-            <a:endParaRPr lang="en-US" altLang="en-US" b="1">
-              <a:latin typeface="Times New Roman" panose="02020603050405020304" charset="0"/>
-              <a:cs typeface="Times New Roman" panose="02020603050405020304" charset="0"/>
-            </a:endParaRPr>
-          </a:p>
-        </p:txBody>
-      </p:sp>
-      <p:sp>
-        <p:nvSpPr>
-          <p:cNvPr id="6" name="Rounded Rectangle 5"/>
-          <p:cNvSpPr/>
-          <p:nvPr/>
-        </p:nvSpPr>
-        <p:spPr>
-          <a:xfrm>
-            <a:off x="3093720" y="114300"/>
-            <a:ext cx="2926715" cy="1043940"/>
-          </a:xfrm>
-          <a:prstGeom prst="roundRect">
-            <a:avLst/>
-          </a:prstGeom>
-        </p:spPr>
-        <p:style>
-          <a:lnRef idx="1">
-            <a:schemeClr val="accent3"/>
-          </a:lnRef>
-          <a:fillRef idx="2">
-            <a:schemeClr val="accent3"/>
-          </a:fillRef>
-          <a:effectRef idx="1">
-            <a:schemeClr val="accent3"/>
-          </a:effectRef>
-          <a:fontRef idx="minor">
-            <a:schemeClr val="dk1"/>
-          </a:fontRef>
-        </p:style>
-        <p:txBody>
-          <a:bodyPr rtlCol="0" anchor="ctr"/>
-          <a:p>
-            <a:pPr algn="ctr"/>
-            <a:r>
-              <a:rPr lang="en-US" altLang="en-US" b="1">
-                <a:latin typeface="Times New Roman" panose="02020603050405020304" charset="0"/>
-                <a:cs typeface="Times New Roman" panose="02020603050405020304" charset="0"/>
-                <a:sym typeface="+mn-ea"/>
-              </a:rPr>
-              <a:t>CONCEPTS GÉNÉRAUX DU DOMAINE</a:t>
-            </a:r>
-            <a:endParaRPr lang="en-US" altLang="en-US" b="1">
-              <a:latin typeface="Times New Roman" panose="02020603050405020304" charset="0"/>
-              <a:cs typeface="Times New Roman" panose="02020603050405020304" charset="0"/>
-            </a:endParaRPr>
-          </a:p>
-        </p:txBody>
-      </p:sp>
-      <p:sp>
-        <p:nvSpPr>
-          <p:cNvPr id="7" name="Rounded Rectangle 6"/>
-          <p:cNvSpPr/>
-          <p:nvPr/>
-        </p:nvSpPr>
-        <p:spPr>
-          <a:xfrm>
-            <a:off x="6135370" y="114300"/>
-            <a:ext cx="2926715" cy="1043940"/>
-          </a:xfrm>
-          <a:prstGeom prst="roundRect">
-            <a:avLst/>
-          </a:prstGeom>
-        </p:spPr>
-        <p:style>
-          <a:lnRef idx="1">
-            <a:schemeClr val="accent3"/>
-          </a:lnRef>
-          <a:fillRef idx="2">
-            <a:schemeClr val="accent3"/>
-          </a:fillRef>
-          <a:effectRef idx="1">
-            <a:schemeClr val="accent3"/>
-          </a:effectRef>
-          <a:fontRef idx="minor">
-            <a:schemeClr val="dk1"/>
-          </a:fontRef>
-        </p:style>
-        <p:txBody>
-          <a:bodyPr rtlCol="0" anchor="ctr"/>
-          <a:p>
-            <a:pPr algn="ctr"/>
-            <a:r>
-              <a:rPr lang="en-US" altLang="en-US" b="1">
-                <a:latin typeface="Times New Roman" panose="02020603050405020304" charset="0"/>
-                <a:cs typeface="Times New Roman" panose="02020603050405020304" charset="0"/>
-                <a:sym typeface="+mn-ea"/>
-              </a:rPr>
-              <a:t>CONCEPTION</a:t>
-            </a:r>
-            <a:endParaRPr lang="en-US" altLang="en-US" b="1">
-              <a:latin typeface="Times New Roman" panose="02020603050405020304" charset="0"/>
-              <a:cs typeface="Times New Roman" panose="02020603050405020304" charset="0"/>
-            </a:endParaRPr>
-          </a:p>
-        </p:txBody>
-      </p:sp>
-      <p:sp>
-        <p:nvSpPr>
-          <p:cNvPr id="8" name="Rounded Rectangle 7"/>
-          <p:cNvSpPr/>
-          <p:nvPr/>
-        </p:nvSpPr>
-        <p:spPr>
-          <a:xfrm>
-            <a:off x="9177020" y="114300"/>
-            <a:ext cx="2926715" cy="1043940"/>
-          </a:xfrm>
-          <a:prstGeom prst="roundRect">
-            <a:avLst/>
-          </a:prstGeom>
-        </p:spPr>
-        <p:style>
-          <a:lnRef idx="1">
-            <a:schemeClr val="accent3"/>
-          </a:lnRef>
-          <a:fillRef idx="2">
-            <a:schemeClr val="accent3"/>
-          </a:fillRef>
-          <a:effectRef idx="1">
-            <a:schemeClr val="accent3"/>
-          </a:effectRef>
-          <a:fontRef idx="minor">
-            <a:schemeClr val="dk1"/>
-          </a:fontRef>
-        </p:style>
-        <p:txBody>
-          <a:bodyPr rtlCol="0" anchor="ctr"/>
-          <a:p>
-            <a:pPr algn="ctr"/>
-            <a:r>
-              <a:rPr lang="en-US" altLang="en-US" b="1">
-                <a:latin typeface="Times New Roman" panose="02020603050405020304" charset="0"/>
-                <a:cs typeface="Times New Roman" panose="02020603050405020304" charset="0"/>
-                <a:sym typeface="+mn-ea"/>
-              </a:rPr>
-              <a:t>MISE EN OEUVRE DE LA SOLUTION</a:t>
-            </a:r>
-            <a:endParaRPr lang="en-US" altLang="en-US" b="1">
-              <a:latin typeface="Times New Roman" panose="02020603050405020304" charset="0"/>
-              <a:cs typeface="Times New Roman" panose="02020603050405020304" charset="0"/>
-            </a:endParaRPr>
-          </a:p>
-        </p:txBody>
-      </p:sp>
-      <p:pic>
-        <p:nvPicPr>
-          <p:cNvPr id="13" name="Picture 12" descr="logo_metrika"/>
-          <p:cNvPicPr>
-            <a:picLocks noChangeAspect="1"/>
-          </p:cNvPicPr>
-          <p:nvPr/>
-        </p:nvPicPr>
-        <p:blipFill>
-          <a:blip r:embed="rId1"/>
-          <a:stretch>
-            <a:fillRect/>
-          </a:stretch>
-        </p:blipFill>
-        <p:spPr>
-          <a:xfrm>
-            <a:off x="762635" y="4604385"/>
-            <a:ext cx="2409190" cy="1004570"/>
-          </a:xfrm>
-          <a:prstGeom prst="rect">
-            <a:avLst/>
-          </a:prstGeom>
-        </p:spPr>
-      </p:pic>
-      <p:sp>
-        <p:nvSpPr>
-          <p:cNvPr id="14" name="Oval 13"/>
-          <p:cNvSpPr/>
-          <p:nvPr/>
-        </p:nvSpPr>
-        <p:spPr>
-          <a:xfrm>
-            <a:off x="321310" y="3061335"/>
-            <a:ext cx="3291840" cy="1168400"/>
-          </a:xfrm>
-          <a:prstGeom prst="ellipse">
-            <a:avLst/>
-          </a:prstGeom>
-        </p:spPr>
-        <p:style>
-          <a:lnRef idx="2">
-            <a:schemeClr val="accent5">
-              <a:shade val="50000"/>
-            </a:schemeClr>
-          </a:lnRef>
-          <a:fillRef idx="1">
-            <a:schemeClr val="accent5"/>
-          </a:fillRef>
-          <a:effectRef idx="0">
-            <a:schemeClr val="accent5"/>
-          </a:effectRef>
-          <a:fontRef idx="minor">
-            <a:schemeClr val="lt1"/>
-          </a:fontRef>
-        </p:style>
-        <p:txBody>
-          <a:bodyPr rtlCol="0" anchor="ctr"/>
-          <a:p>
-            <a:pPr algn="ctr"/>
-            <a:r>
-              <a:rPr lang="en-US" altLang="en-US" sz="2200" b="1">
-                <a:latin typeface="Times New Roman" panose="02020603050405020304" charset="0"/>
-                <a:cs typeface="Times New Roman" panose="02020603050405020304" charset="0"/>
-              </a:rPr>
-              <a:t>Qui est Métrika-IDB ?</a:t>
-            </a:r>
-            <a:endParaRPr lang="en-US" altLang="en-US" sz="2200" b="1">
-              <a:latin typeface="Times New Roman" panose="02020603050405020304" charset="0"/>
-              <a:cs typeface="Times New Roman" panose="02020603050405020304" charset="0"/>
-            </a:endParaRPr>
-          </a:p>
-        </p:txBody>
-      </p:sp>
-      <p:sp>
-        <p:nvSpPr>
-          <p:cNvPr id="17" name="Rounded Rectangular Callout 16"/>
-          <p:cNvSpPr/>
-          <p:nvPr/>
-        </p:nvSpPr>
-        <p:spPr>
-          <a:xfrm>
-            <a:off x="5171440" y="3061335"/>
-            <a:ext cx="6993255" cy="3669030"/>
-          </a:xfrm>
-          <a:prstGeom prst="wedgeRoundRectCallout">
-            <a:avLst>
-              <a:gd name="adj1" fmla="val -72219"/>
-              <a:gd name="adj2" fmla="val -35064"/>
-              <a:gd name="adj3" fmla="val 16667"/>
-            </a:avLst>
-          </a:prstGeom>
-        </p:spPr>
-        <p:style>
-          <a:lnRef idx="1">
-            <a:schemeClr val="accent6"/>
-          </a:lnRef>
-          <a:fillRef idx="3">
-            <a:schemeClr val="accent6"/>
-          </a:fillRef>
-          <a:effectRef idx="2">
-            <a:schemeClr val="accent6"/>
-          </a:effectRef>
-          <a:fontRef idx="minor">
-            <a:schemeClr val="lt1"/>
-          </a:fontRef>
-        </p:style>
-        <p:txBody>
-          <a:bodyPr rtlCol="0" anchor="ctr"/>
-          <a:p>
-            <a:pPr algn="just"/>
-            <a:r>
-              <a:rPr lang="en-US" altLang="en-US" sz="2400">
-                <a:solidFill>
-                  <a:schemeClr val="tx1"/>
-                </a:solidFill>
-                <a:latin typeface="Times New Roman" panose="02020603050405020304" charset="0"/>
-                <a:cs typeface="Times New Roman" panose="02020603050405020304" charset="0"/>
-              </a:rPr>
-              <a:t>	Entreprise informatique opérant dans :  </a:t>
-            </a:r>
-            <a:endParaRPr lang="en-US" altLang="en-US" sz="2400">
-              <a:solidFill>
-                <a:schemeClr val="tx1"/>
-              </a:solidFill>
-              <a:latin typeface="Times New Roman" panose="02020603050405020304" charset="0"/>
-              <a:cs typeface="Times New Roman" panose="02020603050405020304" charset="0"/>
-            </a:endParaRPr>
-          </a:p>
-          <a:p>
-            <a:pPr algn="just"/>
-            <a:endParaRPr lang="en-US" altLang="en-US" sz="2400">
-              <a:solidFill>
-                <a:schemeClr val="tx1"/>
-              </a:solidFill>
-              <a:latin typeface="Times New Roman" panose="02020603050405020304" charset="0"/>
-              <a:cs typeface="Times New Roman" panose="02020603050405020304" charset="0"/>
-            </a:endParaRPr>
-          </a:p>
-          <a:p>
-            <a:pPr marL="285750" indent="-285750" algn="just">
-              <a:buFont typeface="Arial" panose="020B0604020202020204" pitchFamily="34" charset="0"/>
-              <a:buChar char="•"/>
-            </a:pPr>
-            <a:r>
-              <a:rPr lang="en-US" altLang="en-US" sz="2400" b="1">
-                <a:solidFill>
-                  <a:schemeClr val="tx1"/>
-                </a:solidFill>
-                <a:latin typeface="Times New Roman" panose="02020603050405020304" charset="0"/>
-                <a:cs typeface="Times New Roman" panose="02020603050405020304" charset="0"/>
-                <a:sym typeface="+mn-ea"/>
-              </a:rPr>
-              <a:t>Intégration de solutions informatiques et édition de logiciels</a:t>
-            </a:r>
-            <a:r>
-              <a:rPr lang="en-US" altLang="en-US" sz="2400" b="1">
-                <a:solidFill>
-                  <a:schemeClr val="tx1"/>
-                </a:solidFill>
-                <a:latin typeface="Times New Roman" panose="02020603050405020304" charset="0"/>
-                <a:cs typeface="Times New Roman" panose="02020603050405020304" charset="0"/>
-              </a:rPr>
-              <a:t> </a:t>
-            </a:r>
-            <a:endParaRPr lang="en-US" altLang="en-US" sz="2400" b="1">
-              <a:solidFill>
-                <a:schemeClr val="tx1"/>
-              </a:solidFill>
-              <a:latin typeface="Times New Roman" panose="02020603050405020304" charset="0"/>
-              <a:cs typeface="Times New Roman" panose="02020603050405020304" charset="0"/>
-            </a:endParaRPr>
-          </a:p>
-          <a:p>
-            <a:pPr indent="0" algn="just">
-              <a:buFont typeface="Arial" panose="020B0604020202020204" pitchFamily="34" charset="0"/>
-              <a:buNone/>
-            </a:pPr>
-            <a:endParaRPr lang="en-US" altLang="en-US" sz="2400" b="1">
-              <a:solidFill>
-                <a:schemeClr val="tx1"/>
-              </a:solidFill>
-              <a:latin typeface="Times New Roman" panose="02020603050405020304" charset="0"/>
-              <a:cs typeface="Times New Roman" panose="02020603050405020304" charset="0"/>
-            </a:endParaRPr>
-          </a:p>
-          <a:p>
-            <a:pPr marL="285750" indent="-285750" algn="just">
-              <a:buFont typeface="Arial" panose="020B0604020202020204" pitchFamily="34" charset="0"/>
-              <a:buChar char="•"/>
-            </a:pPr>
-            <a:r>
-              <a:rPr lang="en-US" altLang="en-US" sz="2400" b="1">
-                <a:solidFill>
-                  <a:schemeClr val="tx1"/>
-                </a:solidFill>
-                <a:latin typeface="Times New Roman" panose="02020603050405020304" charset="0"/>
-                <a:cs typeface="Times New Roman" panose="02020603050405020304" charset="0"/>
-              </a:rPr>
-              <a:t>Encadrement de la recherche et des tâches de développement</a:t>
-            </a:r>
-            <a:endParaRPr lang="en-US" altLang="en-US" sz="2400" b="1">
-              <a:solidFill>
-                <a:schemeClr val="tx1"/>
-              </a:solidFill>
-              <a:latin typeface="Times New Roman" panose="02020603050405020304" charset="0"/>
-              <a:cs typeface="Times New Roman" panose="02020603050405020304" charset="0"/>
-            </a:endParaRPr>
-          </a:p>
-          <a:p>
-            <a:pPr indent="0" algn="just">
-              <a:buFont typeface="Arial" panose="020B0604020202020204" pitchFamily="34" charset="0"/>
-              <a:buNone/>
-            </a:pPr>
-            <a:endParaRPr lang="en-US" altLang="en-US" sz="2400" b="1">
-              <a:solidFill>
-                <a:schemeClr val="tx1"/>
-              </a:solidFill>
-              <a:latin typeface="Times New Roman" panose="02020603050405020304" charset="0"/>
-              <a:cs typeface="Times New Roman" panose="02020603050405020304" charset="0"/>
-            </a:endParaRPr>
-          </a:p>
-          <a:p>
-            <a:pPr marL="285750" indent="-285750" algn="just">
-              <a:buFont typeface="Arial" panose="020B0604020202020204" pitchFamily="34" charset="0"/>
-              <a:buChar char="•"/>
-            </a:pPr>
-            <a:r>
-              <a:rPr lang="en-US" altLang="en-US" sz="2400" b="1">
-                <a:solidFill>
-                  <a:schemeClr val="tx1"/>
-                </a:solidFill>
-                <a:latin typeface="Times New Roman" panose="02020603050405020304" charset="0"/>
-                <a:cs typeface="Times New Roman" panose="02020603050405020304" charset="0"/>
-              </a:rPr>
-              <a:t>Participation aux tests de nouveauté</a:t>
-            </a:r>
-            <a:endParaRPr lang="en-US" altLang="en-US" sz="2400" b="1">
-              <a:solidFill>
-                <a:schemeClr val="tx1"/>
-              </a:solidFill>
-              <a:latin typeface="Times New Roman" panose="02020603050405020304" charset="0"/>
-              <a:cs typeface="Times New Roman" panose="02020603050405020304" charset="0"/>
-            </a:endParaRPr>
-          </a:p>
-          <a:p>
-            <a:pPr algn="just"/>
-            <a:r>
-              <a:rPr lang="en-US" altLang="en-US" sz="2400">
-                <a:solidFill>
-                  <a:schemeClr val="tx1"/>
-                </a:solidFill>
-                <a:latin typeface="Times New Roman" panose="02020603050405020304" charset="0"/>
-                <a:cs typeface="Times New Roman" panose="02020603050405020304" charset="0"/>
-              </a:rPr>
-              <a:t> </a:t>
-            </a:r>
-            <a:endParaRPr lang="en-US" altLang="en-US" sz="2400">
-              <a:solidFill>
-                <a:schemeClr val="tx1"/>
-              </a:solidFill>
-              <a:latin typeface="Times New Roman" panose="02020603050405020304" charset="0"/>
-              <a:cs typeface="Times New Roman" panose="02020603050405020304" charset="0"/>
-            </a:endParaRPr>
-          </a:p>
-        </p:txBody>
-      </p:sp>
-      <p:sp>
-        <p:nvSpPr>
-          <p:cNvPr id="9" name="Rounded Rectangular Callout 8"/>
-          <p:cNvSpPr/>
-          <p:nvPr/>
-        </p:nvSpPr>
-        <p:spPr>
-          <a:xfrm>
-            <a:off x="4902200" y="1668780"/>
-            <a:ext cx="6909435" cy="882650"/>
-          </a:xfrm>
-          <a:prstGeom prst="wedgeRoundRectCallout">
-            <a:avLst>
-              <a:gd name="adj1" fmla="val -99308"/>
-              <a:gd name="adj2" fmla="val 96425"/>
-              <a:gd name="adj3" fmla="val 16667"/>
-            </a:avLst>
-          </a:prstGeom>
-        </p:spPr>
-        <p:style>
-          <a:lnRef idx="2">
-            <a:schemeClr val="accent6">
-              <a:shade val="50000"/>
-            </a:schemeClr>
-          </a:lnRef>
-          <a:fillRef idx="1">
-            <a:schemeClr val="accent6"/>
-          </a:fillRef>
-          <a:effectRef idx="0">
-            <a:schemeClr val="accent6"/>
-          </a:effectRef>
-          <a:fontRef idx="minor">
-            <a:schemeClr val="lt1"/>
-          </a:fontRef>
-        </p:style>
-        <p:txBody>
-          <a:bodyPr rtlCol="0" anchor="ctr"/>
-          <a:p>
-            <a:pPr algn="just"/>
-            <a:r>
-              <a:rPr lang="en-US" altLang="en-US" sz="2400" b="1">
-                <a:latin typeface="Times New Roman" panose="02020603050405020304" charset="0"/>
-                <a:cs typeface="Times New Roman" panose="02020603050405020304" charset="0"/>
-              </a:rPr>
-              <a:t>Naissance :</a:t>
-            </a:r>
-            <a:r>
-              <a:rPr lang="en-US" altLang="en-US" sz="2400" b="1">
-                <a:solidFill>
-                  <a:schemeClr val="tx1"/>
-                </a:solidFill>
-                <a:latin typeface="Times New Roman" panose="02020603050405020304" charset="0"/>
-                <a:cs typeface="Times New Roman" panose="02020603050405020304" charset="0"/>
-              </a:rPr>
-              <a:t> 1995</a:t>
-            </a:r>
-            <a:endParaRPr lang="en-US" altLang="en-US" sz="2400" b="1">
-              <a:solidFill>
-                <a:schemeClr val="tx1"/>
-              </a:solidFill>
-              <a:latin typeface="Times New Roman" panose="02020603050405020304" charset="0"/>
-              <a:cs typeface="Times New Roman" panose="02020603050405020304" charset="0"/>
-            </a:endParaRPr>
-          </a:p>
-          <a:p>
-            <a:pPr algn="just"/>
-            <a:r>
-              <a:rPr lang="en-US" altLang="en-US" sz="2400" b="1">
-                <a:latin typeface="Times New Roman" panose="02020603050405020304" charset="0"/>
-                <a:cs typeface="Times New Roman" panose="02020603050405020304" charset="0"/>
-              </a:rPr>
-              <a:t>Siège : </a:t>
-            </a:r>
-            <a:r>
-              <a:rPr lang="en-US" altLang="en-US" sz="2400" b="1">
-                <a:solidFill>
-                  <a:schemeClr val="tx1"/>
-                </a:solidFill>
-                <a:latin typeface="Times New Roman" panose="02020603050405020304" charset="0"/>
-                <a:cs typeface="Times New Roman" panose="02020603050405020304" charset="0"/>
-              </a:rPr>
-              <a:t>Immeuble Atlantis II ACAE, LIBREVILLE</a:t>
-            </a:r>
-            <a:endParaRPr lang="en-US" altLang="en-US" sz="2400" b="1">
-              <a:solidFill>
-                <a:schemeClr val="tx1"/>
-              </a:solidFill>
-              <a:latin typeface="Times New Roman" panose="02020603050405020304" charset="0"/>
-              <a:cs typeface="Times New Roman" panose="02020603050405020304" charset="0"/>
-            </a:endParaRPr>
-          </a:p>
-        </p:txBody>
-      </p:sp>
-    </p:spTree>
-  </p:cSld>
-  <p:clrMapOvr>
-    <a:masterClrMapping/>
-  </p:clrMapOvr>
-  <p:transition>
-    <p:push dir="u"/>
-  </p:transition>
-  <p:timing>
-    <p:tnLst>
-      <p:par>
-        <p:cTn id="1" dur="indefinite" restart="never" nodeType="tmRoot">
-          <p:childTnLst>
-            <p:seq concurrent="1" nextAc="seek">
-              <p:cTn id="2" dur="indefinite" nodeType="mainSeq">
-                <p:childTnLst>
-                  <p:par>
-                    <p:cTn id="3" fill="hold">
-                      <p:stCondLst>
-                        <p:cond delay="indefinite"/>
-                        <p:cond evt="onBegin" delay="0">
-                          <p:tn val="2"/>
-                        </p:cond>
-                      </p:stCondLst>
-                      <p:childTnLst>
-                        <p:par>
-                          <p:cTn id="4" fill="hold">
-                            <p:stCondLst>
-                              <p:cond delay="0"/>
-                            </p:stCondLst>
-                            <p:childTnLst>
-                              <p:par>
-                                <p:cTn id="5" presetID="42" presetClass="entr" presetSubtype="0" fill="hold" grpId="0" nodeType="afterEffect">
-                                  <p:stCondLst>
-                                    <p:cond delay="0"/>
-                                  </p:stCondLst>
-                                  <p:childTnLst>
-                                    <p:set>
-                                      <p:cBhvr>
-                                        <p:cTn id="6" dur="500" fill="hold">
-                                          <p:stCondLst>
-                                            <p:cond delay="0"/>
-                                          </p:stCondLst>
-                                        </p:cTn>
-                                        <p:tgtEl>
-                                          <p:spTgt spid="9"/>
-                                        </p:tgtEl>
-                                        <p:attrNameLst>
-                                          <p:attrName>style.visibility</p:attrName>
-                                        </p:attrNameLst>
-                                      </p:cBhvr>
-                                      <p:to>
-                                        <p:strVal val="visible"/>
-                                      </p:to>
-                                    </p:set>
-                                    <p:animEffect transition="in" filter="fade">
-                                      <p:cBhvr>
-                                        <p:cTn id="7" dur="500"/>
-                                        <p:tgtEl>
-                                          <p:spTgt spid="9"/>
-                                        </p:tgtEl>
-                                      </p:cBhvr>
-                                    </p:animEffect>
-                                    <p:anim calcmode="lin" valueType="num">
-                                      <p:cBhvr>
-                                        <p:cTn id="8" dur="500" fill="hold"/>
-                                        <p:tgtEl>
-                                          <p:spTgt spid="9"/>
-                                        </p:tgtEl>
-                                        <p:attrNameLst>
-                                          <p:attrName>ppt_x</p:attrName>
-                                        </p:attrNameLst>
-                                      </p:cBhvr>
-                                      <p:tavLst>
-                                        <p:tav tm="0">
-                                          <p:val>
-                                            <p:strVal val="#ppt_x"/>
-                                          </p:val>
-                                        </p:tav>
-                                        <p:tav tm="100000">
-                                          <p:val>
-                                            <p:strVal val="#ppt_x"/>
-                                          </p:val>
-                                        </p:tav>
-                                      </p:tavLst>
-                                    </p:anim>
-                                    <p:anim calcmode="lin" valueType="num">
-                                      <p:cBhvr>
-                                        <p:cTn id="9" dur="500" fill="hold"/>
-                                        <p:tgtEl>
-                                          <p:spTgt spid="9"/>
-                                        </p:tgtEl>
-                                        <p:attrNameLst>
-                                          <p:attrName>ppt_y</p:attrName>
-                                        </p:attrNameLst>
-                                      </p:cBhvr>
-                                      <p:tavLst>
-                                        <p:tav tm="0">
-                                          <p:val>
-                                            <p:strVal val="#ppt_y+.1"/>
-                                          </p:val>
-                                        </p:tav>
-                                        <p:tav tm="100000">
-                                          <p:val>
-                                            <p:strVal val="#ppt_y"/>
-                                          </p:val>
-                                        </p:tav>
-                                      </p:tavLst>
-                                    </p:anim>
-                                  </p:childTnLst>
-                                </p:cTn>
-                              </p:par>
-                            </p:childTnLst>
-                          </p:cTn>
-                        </p:par>
-                        <p:par>
-                          <p:cTn id="10" fill="hold">
-                            <p:stCondLst>
-                              <p:cond delay="500"/>
-                            </p:stCondLst>
-                            <p:childTnLst>
-                              <p:par>
-                                <p:cTn id="11" presetID="42" presetClass="entr" presetSubtype="0" fill="hold" grpId="0" nodeType="afterEffect">
-                                  <p:stCondLst>
-                                    <p:cond delay="0"/>
-                                  </p:stCondLst>
-                                  <p:childTnLst>
-                                    <p:set>
-                                      <p:cBhvr>
-                                        <p:cTn id="12" dur="1" fill="hold">
-                                          <p:stCondLst>
-                                            <p:cond delay="0"/>
-                                          </p:stCondLst>
-                                        </p:cTn>
-                                        <p:tgtEl>
-                                          <p:spTgt spid="14"/>
-                                        </p:tgtEl>
-                                        <p:attrNameLst>
-                                          <p:attrName>style.visibility</p:attrName>
-                                        </p:attrNameLst>
-                                      </p:cBhvr>
-                                      <p:to>
-                                        <p:strVal val="visible"/>
-                                      </p:to>
-                                    </p:set>
-                                    <p:animEffect transition="in" filter="fade">
-                                      <p:cBhvr>
-                                        <p:cTn id="13" dur="1000"/>
-                                        <p:tgtEl>
-                                          <p:spTgt spid="14"/>
-                                        </p:tgtEl>
-                                      </p:cBhvr>
-                                    </p:animEffect>
-                                    <p:anim calcmode="lin" valueType="num">
-                                      <p:cBhvr>
-                                        <p:cTn id="14" dur="1000" fill="hold"/>
-                                        <p:tgtEl>
-                                          <p:spTgt spid="14"/>
-                                        </p:tgtEl>
-                                        <p:attrNameLst>
-                                          <p:attrName>ppt_x</p:attrName>
-                                        </p:attrNameLst>
-                                      </p:cBhvr>
-                                      <p:tavLst>
-                                        <p:tav tm="0">
-                                          <p:val>
-                                            <p:strVal val="#ppt_x"/>
-                                          </p:val>
-                                        </p:tav>
-                                        <p:tav tm="100000">
-                                          <p:val>
-                                            <p:strVal val="#ppt_x"/>
-                                          </p:val>
-                                        </p:tav>
-                                      </p:tavLst>
-                                    </p:anim>
-                                    <p:anim calcmode="lin" valueType="num">
-                                      <p:cBhvr>
-                                        <p:cTn id="15" dur="1000" fill="hold"/>
-                                        <p:tgtEl>
-                                          <p:spTgt spid="14"/>
-                                        </p:tgtEl>
-                                        <p:attrNameLst>
-                                          <p:attrName>ppt_y</p:attrName>
-                                        </p:attrNameLst>
-                                      </p:cBhvr>
-                                      <p:tavLst>
-                                        <p:tav tm="0">
-                                          <p:val>
-                                            <p:strVal val="#ppt_y+.1"/>
-                                          </p:val>
-                                        </p:tav>
-                                        <p:tav tm="100000">
-                                          <p:val>
-                                            <p:strVal val="#ppt_y"/>
-                                          </p:val>
-                                        </p:tav>
-                                      </p:tavLst>
-                                    </p:anim>
-                                  </p:childTnLst>
-                                </p:cTn>
-                              </p:par>
-                            </p:childTnLst>
-                          </p:cTn>
-                        </p:par>
-                        <p:par>
-                          <p:cTn id="16" fill="hold">
-                            <p:stCondLst>
-                              <p:cond delay="1500"/>
-                            </p:stCondLst>
-                            <p:childTnLst>
-                              <p:par>
-                                <p:cTn id="17" presetID="42" presetClass="entr" presetSubtype="0" fill="hold" nodeType="afterEffect">
-                                  <p:stCondLst>
-                                    <p:cond delay="0"/>
-                                  </p:stCondLst>
-                                  <p:childTnLst>
-                                    <p:set>
-                                      <p:cBhvr>
-                                        <p:cTn id="18" dur="1" fill="hold">
-                                          <p:stCondLst>
-                                            <p:cond delay="0"/>
-                                          </p:stCondLst>
-                                        </p:cTn>
-                                        <p:tgtEl>
-                                          <p:spTgt spid="13"/>
-                                        </p:tgtEl>
-                                        <p:attrNameLst>
-                                          <p:attrName>style.visibility</p:attrName>
-                                        </p:attrNameLst>
-                                      </p:cBhvr>
-                                      <p:to>
-                                        <p:strVal val="visible"/>
-                                      </p:to>
-                                    </p:set>
-                                    <p:animEffect transition="in" filter="fade">
-                                      <p:cBhvr>
-                                        <p:cTn id="19" dur="1000"/>
-                                        <p:tgtEl>
-                                          <p:spTgt spid="13"/>
-                                        </p:tgtEl>
-                                      </p:cBhvr>
-                                    </p:animEffect>
-                                    <p:anim calcmode="lin" valueType="num">
-                                      <p:cBhvr>
-                                        <p:cTn id="20" dur="1000" fill="hold"/>
-                                        <p:tgtEl>
-                                          <p:spTgt spid="13"/>
-                                        </p:tgtEl>
-                                        <p:attrNameLst>
-                                          <p:attrName>ppt_x</p:attrName>
-                                        </p:attrNameLst>
-                                      </p:cBhvr>
-                                      <p:tavLst>
-                                        <p:tav tm="0">
-                                          <p:val>
-                                            <p:strVal val="#ppt_x"/>
-                                          </p:val>
-                                        </p:tav>
-                                        <p:tav tm="100000">
-                                          <p:val>
-                                            <p:strVal val="#ppt_x"/>
-                                          </p:val>
-                                        </p:tav>
-                                      </p:tavLst>
-                                    </p:anim>
-                                    <p:anim calcmode="lin" valueType="num">
-                                      <p:cBhvr>
-                                        <p:cTn id="21" dur="1000" fill="hold"/>
-                                        <p:tgtEl>
-                                          <p:spTgt spid="13"/>
-                                        </p:tgtEl>
-                                        <p:attrNameLst>
-                                          <p:attrName>ppt_y</p:attrName>
-                                        </p:attrNameLst>
-                                      </p:cBhvr>
-                                      <p:tavLst>
-                                        <p:tav tm="0">
-                                          <p:val>
-                                            <p:strVal val="#ppt_y+.1"/>
-                                          </p:val>
-                                        </p:tav>
-                                        <p:tav tm="100000">
-                                          <p:val>
-                                            <p:strVal val="#ppt_y"/>
-                                          </p:val>
-                                        </p:tav>
-                                      </p:tavLst>
-                                    </p:anim>
-                                  </p:childTnLst>
-                                </p:cTn>
-                              </p:par>
-                            </p:childTnLst>
-                          </p:cTn>
-                        </p:par>
-                      </p:childTnLst>
-                    </p:cTn>
-                  </p:par>
-                  <p:par>
-                    <p:cTn id="22" fill="hold">
-                      <p:stCondLst>
-                        <p:cond delay="indefinite"/>
-                      </p:stCondLst>
-                      <p:childTnLst>
-                        <p:par>
-                          <p:cTn id="23" fill="hold">
-                            <p:stCondLst>
-                              <p:cond delay="0"/>
-                            </p:stCondLst>
-                            <p:childTnLst>
-                              <p:par>
-                                <p:cTn id="24" presetID="42" presetClass="entr" presetSubtype="0" fill="hold" grpId="0" nodeType="clickEffect">
-                                  <p:stCondLst>
-                                    <p:cond delay="0"/>
-                                  </p:stCondLst>
-                                  <p:childTnLst>
-                                    <p:set>
-                                      <p:cBhvr>
-                                        <p:cTn id="25" dur="500" fill="hold">
-                                          <p:stCondLst>
-                                            <p:cond delay="0"/>
-                                          </p:stCondLst>
-                                        </p:cTn>
-                                        <p:tgtEl>
-                                          <p:spTgt spid="17"/>
-                                        </p:tgtEl>
-                                        <p:attrNameLst>
-                                          <p:attrName>style.visibility</p:attrName>
-                                        </p:attrNameLst>
-                                      </p:cBhvr>
-                                      <p:to>
-                                        <p:strVal val="visible"/>
-                                      </p:to>
-                                    </p:set>
-                                    <p:animEffect transition="in" filter="fade">
-                                      <p:cBhvr>
-                                        <p:cTn id="26" dur="500"/>
-                                        <p:tgtEl>
-                                          <p:spTgt spid="17"/>
-                                        </p:tgtEl>
-                                      </p:cBhvr>
-                                    </p:animEffect>
-                                    <p:anim calcmode="lin" valueType="num">
-                                      <p:cBhvr>
-                                        <p:cTn id="27" dur="500" fill="hold"/>
-                                        <p:tgtEl>
-                                          <p:spTgt spid="17"/>
-                                        </p:tgtEl>
-                                        <p:attrNameLst>
-                                          <p:attrName>ppt_x</p:attrName>
-                                        </p:attrNameLst>
-                                      </p:cBhvr>
-                                      <p:tavLst>
-                                        <p:tav tm="0">
-                                          <p:val>
-                                            <p:strVal val="#ppt_x"/>
-                                          </p:val>
-                                        </p:tav>
-                                        <p:tav tm="100000">
-                                          <p:val>
-                                            <p:strVal val="#ppt_x"/>
-                                          </p:val>
-                                        </p:tav>
-                                      </p:tavLst>
-                                    </p:anim>
-                                    <p:anim calcmode="lin" valueType="num">
-                                      <p:cBhvr>
-                                        <p:cTn id="28" dur="500" fill="hold"/>
-                                        <p:tgtEl>
-                                          <p:spTgt spid="17"/>
-                                        </p:tgtEl>
-                                        <p:attrNameLst>
-                                          <p:attrName>ppt_y</p:attrName>
-                                        </p:attrNameLst>
-                                      </p:cBhvr>
-                                      <p:tavLst>
-                                        <p:tav tm="0">
-                                          <p:val>
-                                            <p:strVal val="#ppt_y+.1"/>
-                                          </p:val>
-                                        </p:tav>
-                                        <p:tav tm="100000">
-                                          <p:val>
-                                            <p:strVal val="#ppt_y"/>
-                                          </p:val>
-                                        </p:tav>
-                                      </p:tavLst>
-                                    </p:anim>
-                                  </p:childTnLst>
-                                </p:cTn>
-                              </p:par>
-                            </p:childTnLst>
-                          </p:cTn>
-                        </p:par>
-                      </p:childTnLst>
-                    </p:cTn>
-                  </p:par>
-                </p:childTnLst>
-              </p:cTn>
-              <p:prevCondLst>
-                <p:cond evt="onPrev" delay="0">
-                  <p:tgtEl>
-                    <p:sldTgt/>
-                  </p:tgtEl>
-                </p:cond>
-              </p:prevCondLst>
-              <p:nextCondLst>
-                <p:cond evt="onNext" delay="0">
-                  <p:tgtEl>
-                    <p:sldTgt/>
-                  </p:tgtEl>
-                </p:cond>
-              </p:nextCondLst>
-            </p:seq>
-          </p:childTnLst>
-        </p:cTn>
-      </p:par>
-    </p:tnLst>
-    <p:bldLst>
-      <p:bldP spid="9" grpId="0" animBg="1"/>
-      <p:bldP spid="14" grpId="0" animBg="1"/>
-      <p:bldP spid="17" grpId="0" animBg="1"/>
-    </p:bldLst>
-  </p:timing>
-</p:sld>
-</file>
-
-<file path=ppt/slides/slide30.xml><?xml version="1.0" encoding="utf-8"?>
+<file path=ppt/slides/slide31.xml><?xml version="1.0" encoding="utf-8"?>
 <p:sld xmlns:a="http://schemas.openxmlformats.org/drawingml/2006/main" xmlns:r="http://schemas.openxmlformats.org/officeDocument/2006/relationships" xmlns:p="http://schemas.openxmlformats.org/presentationml/2006/main">
   <p:cSld>
     <p:spTree>

</xml_diff>

<commit_message>
show gif while uploading file, validate create user and create publisher forms when no fill has been blur,
</commit_message>
<xml_diff>
--- a/Documents/theme/diapo.pptx
+++ b/Documents/theme/diapo.pptx
@@ -5842,9 +5842,9 @@
         <p:grpSpPr>
           <a:xfrm>
             <a:off x="83185" y="3918585"/>
-            <a:ext cx="11783060" cy="2811780"/>
+            <a:ext cx="11783695" cy="2811780"/>
             <a:chOff x="131" y="6171"/>
-            <a:chExt cx="18556" cy="4428"/>
+            <a:chExt cx="18557" cy="4428"/>
           </a:xfrm>
         </p:grpSpPr>
         <p:grpSp>
@@ -5919,12 +5919,12 @@
             <p:spPr>
               <a:xfrm>
                 <a:off x="5157" y="6171"/>
-                <a:ext cx="12222" cy="1293"/>
+                <a:ext cx="12809" cy="1293"/>
               </a:xfrm>
               <a:prstGeom prst="wedgeRoundRectCallout">
                 <a:avLst>
-                  <a:gd name="adj1" fmla="val -77655"/>
-                  <a:gd name="adj2" fmla="val 131747"/>
+                  <a:gd name="adj1" fmla="val -68752"/>
+                  <a:gd name="adj2" fmla="val 129737"/>
                   <a:gd name="adj3" fmla="val 16667"/>
                 </a:avLst>
               </a:prstGeom>
@@ -5957,7 +5957,27 @@
                     <a:latin typeface="Times New Roman" panose="02020603050405020304" charset="0"/>
                     <a:cs typeface="Times New Roman" panose="02020603050405020304" charset="0"/>
                   </a:rPr>
-                  <a:t>mode de </a:t>
+                  <a:t>m</a:t>
+                </a:r>
+                <a:r>
+                  <a:rPr lang="" altLang="en-US" sz="2200" b="1">
+                    <a:solidFill>
+                      <a:schemeClr val="tx1"/>
+                    </a:solidFill>
+                    <a:latin typeface="Times New Roman" panose="02020603050405020304" charset="0"/>
+                    <a:cs typeface="Times New Roman" panose="02020603050405020304" charset="0"/>
+                  </a:rPr>
+                  <a:t>éthode</a:t>
+                </a:r>
+                <a:r>
+                  <a:rPr lang="en-US" altLang="en-US" sz="2200" b="1">
+                    <a:solidFill>
+                      <a:schemeClr val="tx1"/>
+                    </a:solidFill>
+                    <a:latin typeface="Times New Roman" panose="02020603050405020304" charset="0"/>
+                    <a:cs typeface="Times New Roman" panose="02020603050405020304" charset="0"/>
+                  </a:rPr>
+                  <a:t> de </a:t>
                 </a:r>
                 <a:r>
                   <a:rPr lang="en-US" sz="2200" b="1">
@@ -5992,8 +6012,8 @@
               </a:xfrm>
               <a:prstGeom prst="wedgeRoundRectCallout">
                 <a:avLst>
-                  <a:gd name="adj1" fmla="val -101336"/>
-                  <a:gd name="adj2" fmla="val 26193"/>
+                  <a:gd name="adj1" fmla="val -93649"/>
+                  <a:gd name="adj2" fmla="val 28973"/>
                   <a:gd name="adj3" fmla="val 16667"/>
                 </a:avLst>
               </a:prstGeom>
@@ -6967,8 +6987,8 @@
         </p:nvSpPr>
         <p:spPr>
           <a:xfrm>
-            <a:off x="214630" y="2575560"/>
-            <a:ext cx="11889740" cy="790575"/>
+            <a:off x="83185" y="2575560"/>
+            <a:ext cx="12021185" cy="790575"/>
           </a:xfrm>
           <a:prstGeom prst="roundRect">
             <a:avLst/>
@@ -10206,6 +10226,16 @@
           <a:p>
             <a:pPr algn="ctr"/>
             <a:r>
+              <a:rPr lang="" altLang="en-US" sz="2200" b="1">
+                <a:solidFill>
+                  <a:schemeClr val="tx1"/>
+                </a:solidFill>
+                <a:latin typeface="Times New Roman" panose="02020603050405020304" charset="0"/>
+                <a:cs typeface="Times New Roman" panose="02020603050405020304" charset="0"/>
+              </a:rPr>
+              <a:t>1- </a:t>
+            </a:r>
+            <a:r>
               <a:rPr lang="en-US" altLang="en-US" sz="2200" b="1">
                 <a:solidFill>
                   <a:schemeClr val="tx1"/>
@@ -11129,8 +11159,8 @@
         </p:nvSpPr>
         <p:spPr>
           <a:xfrm>
-            <a:off x="635000" y="3510915"/>
-            <a:ext cx="3115310" cy="1134745"/>
+            <a:off x="437515" y="3510915"/>
+            <a:ext cx="3312795" cy="1134745"/>
           </a:xfrm>
           <a:prstGeom prst="ellipse">
             <a:avLst/>
@@ -11156,6 +11186,16 @@
           <a:bodyPr rtlCol="0" anchor="ctr"/>
           <a:p>
             <a:pPr algn="ctr"/>
+            <a:r>
+              <a:rPr lang="" altLang="en-US" sz="2200" b="1">
+                <a:solidFill>
+                  <a:schemeClr val="tx1"/>
+                </a:solidFill>
+                <a:latin typeface="Times New Roman" panose="02020603050405020304" charset="0"/>
+                <a:cs typeface="Times New Roman" panose="02020603050405020304" charset="0"/>
+              </a:rPr>
+              <a:t>2- </a:t>
+            </a:r>
             <a:r>
               <a:rPr lang="en-US" altLang="en-US" sz="2200" b="1">
                 <a:solidFill>
@@ -11933,6 +11973,16 @@
           <a:bodyPr rtlCol="0" anchor="ctr"/>
           <a:p>
             <a:pPr algn="ctr"/>
+            <a:r>
+              <a:rPr lang="" altLang="en-US" sz="2200" b="1">
+                <a:solidFill>
+                  <a:schemeClr val="tx1"/>
+                </a:solidFill>
+                <a:latin typeface="Times New Roman" panose="02020603050405020304" charset="0"/>
+                <a:cs typeface="Times New Roman" panose="02020603050405020304" charset="0"/>
+              </a:rPr>
+              <a:t>2- </a:t>
+            </a:r>
             <a:r>
               <a:rPr lang="en-US" altLang="en-US" sz="2200" b="1">
                 <a:solidFill>
@@ -12992,8 +13042,8 @@
         </p:nvSpPr>
         <p:spPr>
           <a:xfrm>
-            <a:off x="1127125" y="3685540"/>
-            <a:ext cx="2868930" cy="1134745"/>
+            <a:off x="601345" y="3685540"/>
+            <a:ext cx="3394710" cy="1134745"/>
           </a:xfrm>
           <a:prstGeom prst="ellipse">
             <a:avLst/>
@@ -13019,6 +13069,16 @@
           <a:bodyPr rtlCol="0" anchor="ctr"/>
           <a:p>
             <a:pPr algn="ctr"/>
+            <a:r>
+              <a:rPr lang="" altLang="en-US" sz="2200" b="1">
+                <a:solidFill>
+                  <a:schemeClr val="tx1"/>
+                </a:solidFill>
+                <a:latin typeface="Times New Roman" panose="02020603050405020304" charset="0"/>
+                <a:cs typeface="Times New Roman" panose="02020603050405020304" charset="0"/>
+              </a:rPr>
+              <a:t>3- </a:t>
+            </a:r>
             <a:r>
               <a:rPr lang="en-US" altLang="en-US" sz="2200" b="1">
                 <a:solidFill>
@@ -13705,8 +13765,8 @@
         </p:nvSpPr>
         <p:spPr>
           <a:xfrm>
-            <a:off x="984250" y="3510915"/>
-            <a:ext cx="2868930" cy="1134745"/>
+            <a:off x="885190" y="3510915"/>
+            <a:ext cx="2983865" cy="1134745"/>
           </a:xfrm>
           <a:prstGeom prst="ellipse">
             <a:avLst/>
@@ -13732,6 +13792,16 @@
           <a:bodyPr rtlCol="0" anchor="ctr"/>
           <a:p>
             <a:pPr algn="ctr"/>
+            <a:r>
+              <a:rPr lang="" altLang="en-US" sz="2200" b="1">
+                <a:solidFill>
+                  <a:schemeClr val="tx1"/>
+                </a:solidFill>
+                <a:latin typeface="Times New Roman" panose="02020603050405020304" charset="0"/>
+                <a:cs typeface="Times New Roman" panose="02020603050405020304" charset="0"/>
+              </a:rPr>
+              <a:t>4- </a:t>
+            </a:r>
             <a:r>
               <a:rPr lang="en-US" sz="2200" b="1">
                 <a:solidFill>
@@ -15802,7 +15872,17 @@
               </a:rPr>
               <a:t>Diagramme de classes préliminaire</a:t>
             </a:r>
-            <a:endParaRPr lang="en-US" altLang="en-US" sz="2200" b="1">
+            <a:r>
+              <a:rPr lang="" altLang="en-US" sz="2200" b="1">
+                <a:solidFill>
+                  <a:schemeClr val="tx1"/>
+                </a:solidFill>
+                <a:latin typeface="Times New Roman" panose="02020603050405020304" charset="0"/>
+                <a:cs typeface="Times New Roman" panose="02020603050405020304" charset="0"/>
+              </a:rPr>
+              <a:t>s</a:t>
+            </a:r>
+            <a:endParaRPr lang="" altLang="en-US" sz="2200" b="1">
               <a:solidFill>
                 <a:schemeClr val="tx1"/>
               </a:solidFill>
@@ -15847,6 +15927,16 @@
           <a:bodyPr rtlCol="0" anchor="ctr"/>
           <a:p>
             <a:pPr algn="ctr"/>
+            <a:r>
+              <a:rPr lang="" altLang="en-US" sz="2400" b="1">
+                <a:solidFill>
+                  <a:schemeClr val="tx1"/>
+                </a:solidFill>
+                <a:latin typeface="Times New Roman" panose="02020603050405020304" charset="0"/>
+                <a:cs typeface="Times New Roman" panose="02020603050405020304" charset="0"/>
+              </a:rPr>
+              <a:t>5- </a:t>
+            </a:r>
             <a:r>
               <a:rPr lang="en-US" sz="2400" b="1">
                 <a:solidFill>
@@ -16710,6 +16800,16 @@
           <a:bodyPr rtlCol="0" anchor="ctr"/>
           <a:p>
             <a:pPr algn="ctr"/>
+            <a:r>
+              <a:rPr lang="" altLang="en-US" sz="2400" b="1">
+                <a:solidFill>
+                  <a:schemeClr val="tx1"/>
+                </a:solidFill>
+                <a:latin typeface="Times New Roman" panose="02020603050405020304" charset="0"/>
+                <a:cs typeface="Times New Roman" panose="02020603050405020304" charset="0"/>
+              </a:rPr>
+              <a:t>5- </a:t>
+            </a:r>
             <a:r>
               <a:rPr lang="en-US" sz="2400" b="1">
                 <a:solidFill>
@@ -19747,8 +19847,8 @@
         </p:nvSpPr>
         <p:spPr>
           <a:xfrm>
-            <a:off x="81915" y="1386205"/>
-            <a:ext cx="12021820" cy="5344160"/>
+            <a:off x="81915" y="1158875"/>
+            <a:ext cx="12021820" cy="5571490"/>
           </a:xfrm>
         </p:spPr>
         <p:txBody>
@@ -19978,7 +20078,7 @@
       </p:sp>
       <p:pic>
         <p:nvPicPr>
-          <p:cNvPr id="5" name="Picture 4" descr="eval_eco"/>
+          <p:cNvPr id="9" name="Picture 8" descr="eval_eco"/>
           <p:cNvPicPr>
             <a:picLocks noChangeAspect="1"/>
           </p:cNvPicPr>
@@ -19992,8 +20092,8 @@
         </p:blipFill>
         <p:spPr>
           <a:xfrm>
-            <a:off x="942975" y="1852930"/>
-            <a:ext cx="10619105" cy="4876800"/>
+            <a:off x="83185" y="1597660"/>
+            <a:ext cx="12020550" cy="5132705"/>
           </a:xfrm>
           <a:prstGeom prst="rect">
             <a:avLst/>
@@ -20032,7 +20132,7 @@
                             </p:stCondLst>
                             <p:childTnLst>
                               <p:par>
-                                <p:cTn id="5" presetID="42" presetClass="entr" presetSubtype="0" fill="hold" nodeType="afterEffect">
+                                <p:cTn id="5" presetID="42" presetClass="entr" presetSubtype="0" fill="hold" nodeType="withEffect">
                                   <p:stCondLst>
                                     <p:cond delay="0"/>
                                   </p:stCondLst>
@@ -20045,7 +20145,7 @@
                                           </p:stCondLst>
                                         </p:cTn>
                                         <p:tgtEl>
-                                          <p:spTgt spid="5"/>
+                                          <p:spTgt spid="9"/>
                                         </p:tgtEl>
                                         <p:attrNameLst>
                                           <p:attrName>style.visibility</p:attrName>
@@ -20059,7 +20159,7 @@
                                       <p:cBhvr>
                                         <p:cTn id="7" dur="1000"/>
                                         <p:tgtEl>
-                                          <p:spTgt spid="5"/>
+                                          <p:spTgt spid="9"/>
                                         </p:tgtEl>
                                       </p:cBhvr>
                                     </p:animEffect>
@@ -20067,7 +20167,7 @@
                                       <p:cBhvr>
                                         <p:cTn id="8" dur="1000" fill="hold"/>
                                         <p:tgtEl>
-                                          <p:spTgt spid="5"/>
+                                          <p:spTgt spid="9"/>
                                         </p:tgtEl>
                                         <p:attrNameLst>
                                           <p:attrName>ppt_x</p:attrName>
@@ -20090,7 +20190,7 @@
                                       <p:cBhvr>
                                         <p:cTn id="9" dur="1000" fill="hold"/>
                                         <p:tgtEl>
-                                          <p:spTgt spid="5"/>
+                                          <p:spTgt spid="9"/>
                                         </p:tgtEl>
                                         <p:attrNameLst>
                                           <p:attrName>ppt_y</p:attrName>
@@ -20598,42 +20698,6 @@
         <p:nvPr/>
       </p:nvGrpSpPr>
       <p:grpSpPr/>
-      <p:sp>
-        <p:nvSpPr>
-          <p:cNvPr id="2" name="Title 1"/>
-          <p:cNvSpPr>
-            <a:spLocks noGrp="1"/>
-          </p:cNvSpPr>
-          <p:nvPr>
-            <p:ph type="title"/>
-          </p:nvPr>
-        </p:nvSpPr>
-        <p:spPr>
-          <a:xfrm>
-            <a:off x="838200" y="233680"/>
-            <a:ext cx="10515600" cy="733425"/>
-          </a:xfrm>
-        </p:spPr>
-        <p:txBody>
-          <a:bodyPr/>
-          <a:p>
-            <a:pPr algn="ctr"/>
-            <a:r>
-              <a:rPr lang="en-US" altLang="en-US" b="1" u="sng">
-                <a:effectLst/>
-                <a:latin typeface="Times New Roman" panose="02020603050405020304" charset="0"/>
-                <a:cs typeface="Times New Roman" panose="02020603050405020304" charset="0"/>
-              </a:rPr>
-              <a:t>CONCLUSION</a:t>
-            </a:r>
-            <a:endParaRPr lang="en-US" altLang="en-US" b="1" u="sng">
-              <a:effectLst/>
-              <a:latin typeface="Times New Roman" panose="02020603050405020304" charset="0"/>
-              <a:cs typeface="Times New Roman" panose="02020603050405020304" charset="0"/>
-            </a:endParaRPr>
-          </a:p>
-        </p:txBody>
-      </p:sp>
       <p:sp>
         <p:nvSpPr>
           <p:cNvPr id="4" name="Rounded Rectangle 3"/>
@@ -20802,10 +20866,10 @@
         </p:nvGrpSpPr>
         <p:grpSpPr>
           <a:xfrm>
-            <a:off x="443865" y="1216025"/>
-            <a:ext cx="11713845" cy="1983105"/>
-            <a:chOff x="699" y="1967"/>
-            <a:chExt cx="18447" cy="3123"/>
+            <a:off x="198120" y="295910"/>
+            <a:ext cx="11960225" cy="2903220"/>
+            <a:chOff x="699" y="518"/>
+            <a:chExt cx="18448" cy="4572"/>
           </a:xfrm>
         </p:grpSpPr>
         <p:sp>
@@ -20889,13 +20953,13 @@
           </p:nvSpPr>
           <p:spPr>
             <a:xfrm>
-              <a:off x="9294" y="1967"/>
-              <a:ext cx="9853" cy="3079"/>
+              <a:off x="9065" y="518"/>
+              <a:ext cx="10082" cy="4528"/>
             </a:xfrm>
             <a:prstGeom prst="wedgeRoundRectCallout">
               <a:avLst>
-                <a:gd name="adj1" fmla="val -72064"/>
-                <a:gd name="adj2" fmla="val -11186"/>
+                <a:gd name="adj1" fmla="val -69046"/>
+                <a:gd name="adj2" fmla="val -6029"/>
                 <a:gd name="adj3" fmla="val 16667"/>
               </a:avLst>
             </a:prstGeom>
@@ -21020,6 +21084,29 @@
                 <a:t>Participation à la gestion des projets d’envergure</a:t>
               </a:r>
               <a:endParaRPr lang="en-US" altLang="en-US" sz="2200" b="1">
+                <a:solidFill>
+                  <a:schemeClr val="tx1"/>
+                </a:solidFill>
+                <a:latin typeface="Times New Roman" panose="02020603050405020304" charset="0"/>
+                <a:cs typeface="Times New Roman" panose="02020603050405020304" charset="0"/>
+              </a:endParaRPr>
+            </a:p>
+            <a:p>
+              <a:pPr marL="285750" indent="-285750" algn="just">
+                <a:buFont typeface="Arial" panose="020B0604020202020204" pitchFamily="34" charset="0"/>
+                <a:buChar char="•"/>
+              </a:pPr>
+              <a:r>
+                <a:rPr lang="" altLang="en-US" sz="2200" b="1">
+                  <a:solidFill>
+                    <a:schemeClr val="tx1"/>
+                  </a:solidFill>
+                  <a:latin typeface="Times New Roman" panose="02020603050405020304" charset="0"/>
+                  <a:cs typeface="Times New Roman" panose="02020603050405020304" charset="0"/>
+                </a:rPr>
+                <a:t>Complétion des connaissances sur la conception, Java, outils et techniques de codage</a:t>
+              </a:r>
+              <a:endParaRPr lang="" altLang="en-US" sz="2200" b="1">
                 <a:solidFill>
                   <a:schemeClr val="tx1"/>
                 </a:solidFill>
@@ -21866,7 +21953,7 @@
         </p:nvSpPr>
         <p:spPr>
           <a:xfrm>
-            <a:off x="871220" y="2766695"/>
+            <a:off x="1036320" y="4889500"/>
             <a:ext cx="3472180" cy="855345"/>
           </a:xfrm>
           <a:prstGeom prst="rect">
@@ -21927,7 +22014,7 @@
         </p:nvSpPr>
         <p:spPr>
           <a:xfrm>
-            <a:off x="702310" y="4345305"/>
+            <a:off x="871220" y="2856865"/>
             <a:ext cx="3472180" cy="855345"/>
           </a:xfrm>
           <a:prstGeom prst="rect">
@@ -26618,9 +26705,6 @@
                     <p:cTn id="3" fill="hold">
                       <p:stCondLst>
                         <p:cond delay="indefinite"/>
-                        <p:cond evt="onBegin" delay="0">
-                          <p:tn val="2"/>
-                        </p:cond>
                       </p:stCondLst>
                       <p:childTnLst>
                         <p:par>
@@ -26630,7 +26714,7 @@
                             </p:stCondLst>
                             <p:childTnLst>
                               <p:par>
-                                <p:cTn id="5" presetID="42" presetClass="entr" presetSubtype="0" fill="hold" grpId="0" nodeType="afterEffect">
+                                <p:cTn id="5" presetID="42" presetClass="entr" presetSubtype="0" fill="hold" grpId="0" nodeType="clickEffect">
                                   <p:stCondLst>
                                     <p:cond delay="0"/>
                                   </p:stCondLst>
@@ -28571,6 +28655,16 @@
                   <a:cs typeface="Times New Roman" panose="02020603050405020304" charset="0"/>
                 </a:rPr>
                 <a:t>contenus multimédia</a:t>
+              </a:r>
+              <a:r>
+                <a:rPr lang="" altLang="en-US" sz="2200" b="1">
+                  <a:solidFill>
+                    <a:schemeClr val="tx1"/>
+                  </a:solidFill>
+                  <a:latin typeface="Times New Roman" panose="02020603050405020304" charset="0"/>
+                  <a:cs typeface="Times New Roman" panose="02020603050405020304" charset="0"/>
+                </a:rPr>
+                <a:t>(image,son, video, etc)</a:t>
               </a:r>
               <a:r>
                 <a:rPr lang="en-US" sz="2200" b="1">

</xml_diff>